<commit_message>
Modifications from Day 1
Also includes additional JSON content
</commit_message>
<xml_diff>
--- a/Slides/10 - ComplexConditionChecks.pptx
+++ b/Slides/10 - ComplexConditionChecks.pptx
@@ -5,22 +5,18 @@
     <p:sldMasterId id="2147484082" r:id="rId46"/>
   </p:sldMasterIdLst>
   <p:notesMasterIdLst>
-    <p:notesMasterId r:id="rId57"/>
+    <p:notesMasterId r:id="rId53"/>
   </p:notesMasterIdLst>
   <p:handoutMasterIdLst>
-    <p:handoutMasterId r:id="rId58"/>
+    <p:handoutMasterId r:id="rId54"/>
   </p:handoutMasterIdLst>
   <p:sldIdLst>
     <p:sldId id="283" r:id="rId47"/>
     <p:sldId id="303" r:id="rId48"/>
     <p:sldId id="305" r:id="rId49"/>
     <p:sldId id="304" r:id="rId50"/>
-    <p:sldId id="306" r:id="rId51"/>
-    <p:sldId id="307" r:id="rId52"/>
-    <p:sldId id="308" r:id="rId53"/>
-    <p:sldId id="309" r:id="rId54"/>
-    <p:sldId id="298" r:id="rId55"/>
-    <p:sldId id="257" r:id="rId56"/>
+    <p:sldId id="298" r:id="rId51"/>
+    <p:sldId id="257" r:id="rId52"/>
   </p:sldIdLst>
   <p:sldSz cx="12436475" cy="6994525"/>
   <p:notesSz cx="6858000" cy="9144000"/>
@@ -128,10 +124,6 @@
             <p14:sldId id="303"/>
             <p14:sldId id="305"/>
             <p14:sldId id="304"/>
-            <p14:sldId id="306"/>
-            <p14:sldId id="307"/>
-            <p14:sldId id="308"/>
-            <p14:sldId id="309"/>
             <p14:sldId id="298"/>
             <p14:sldId id="257"/>
           </p14:sldIdLst>
@@ -831,7 +823,7 @@
               <a:rPr lang="en-US" smtClean="0">
                 <a:latin typeface="Segoe UI" pitchFamily="34" charset="0"/>
               </a:rPr>
-              <a:t>6/9/2019 4:56 PM</a:t>
+              <a:t>6/10/2019 1:27 PM</a:t>
             </a:fld>
             <a:endParaRPr lang="en-US" dirty="0">
               <a:latin typeface="Segoe UI" pitchFamily="34" charset="0"/>
@@ -1109,7 +1101,7 @@
           <a:p>
             <a:fld id="{38EEC551-8CDA-4EB6-89BB-2A86C9F091C8}" type="datetime8">
               <a:rPr lang="en-US" smtClean="0"/>
-              <a:t>6/9/2019 4:56 PM</a:t>
+              <a:t>6/10/2019 1:26 PM</a:t>
             </a:fld>
             <a:endParaRPr lang="en-US" dirty="0"/>
           </a:p>
@@ -1443,7 +1435,7 @@
           <a:p>
             <a:fld id="{6108602D-D426-4C00-B215-BFA18C076426}" type="datetime8">
               <a:rPr lang="en-US" smtClean="0"/>
-              <a:t>6/9/2019 4:56 PM</a:t>
+              <a:t>6/10/2019 1:26 PM</a:t>
             </a:fld>
             <a:endParaRPr lang="en-US" dirty="0"/>
           </a:p>
@@ -1608,7 +1600,7 @@
           <a:p>
             <a:fld id="{6108602D-D426-4C00-B215-BFA18C076426}" type="datetime8">
               <a:rPr lang="en-US" smtClean="0"/>
-              <a:t>6/9/2019 4:56 PM</a:t>
+              <a:t>6/10/2019 1:26 PM</a:t>
             </a:fld>
             <a:endParaRPr lang="en-US" dirty="0"/>
           </a:p>
@@ -1773,7 +1765,7 @@
           <a:p>
             <a:fld id="{6108602D-D426-4C00-B215-BFA18C076426}" type="datetime8">
               <a:rPr lang="en-US" smtClean="0"/>
-              <a:t>6/9/2019 4:56 PM</a:t>
+              <a:t>6/10/2019 1:26 PM</a:t>
             </a:fld>
             <a:endParaRPr lang="en-US" dirty="0"/>
           </a:p>
@@ -1938,667 +1930,7 @@
           <a:p>
             <a:fld id="{6108602D-D426-4C00-B215-BFA18C076426}" type="datetime8">
               <a:rPr lang="en-US" smtClean="0"/>
-              <a:t>6/9/2019 4:56 PM</a:t>
-            </a:fld>
-            <a:endParaRPr lang="en-US" dirty="0"/>
-          </a:p>
-        </p:txBody>
-      </p:sp>
-      <p:sp>
-        <p:nvSpPr>
-          <p:cNvPr id="4" name="Footer Placeholder 3"/>
-          <p:cNvSpPr>
-            <a:spLocks noGrp="1"/>
-          </p:cNvSpPr>
-          <p:nvPr>
-            <p:ph type="ftr" sz="quarter" idx="14"/>
-          </p:nvPr>
-        </p:nvSpPr>
-        <p:spPr/>
-        <p:txBody>
-          <a:bodyPr/>
-          <a:lstStyle/>
-          <a:p>
-            <a:pPr defTabSz="914099" eaLnBrk="0" hangingPunct="0"/>
-            <a:r>
-              <a:rPr lang="en-US" sz="400" dirty="0">
-                <a:gradFill>
-                  <a:gsLst>
-                    <a:gs pos="0">
-                      <a:prstClr val="black"/>
-                    </a:gs>
-                    <a:gs pos="100000">
-                      <a:prstClr val="black"/>
-                    </a:gs>
-                  </a:gsLst>
-                  <a:lin ang="5400000" scaled="0"/>
-                </a:gradFill>
-                <a:latin typeface="Segoe UI" pitchFamily="34" charset="0"/>
-                <a:ea typeface="Segoe UI" pitchFamily="34" charset="0"/>
-                <a:cs typeface="Segoe UI" pitchFamily="34" charset="0"/>
-              </a:rPr>
-              <a:t>© 2014 Microsoft Corporation. All rights reserved. MICROSOFT MAKES NO WARRANTIES, EXPRESS, IMPLIED OR STATUTORY, AS TO THE INFORMATION IN THIS PRESENTATION.</a:t>
-            </a:r>
-          </a:p>
-        </p:txBody>
-      </p:sp>
-      <p:sp>
-        <p:nvSpPr>
-          <p:cNvPr id="5" name="Header Placeholder 4"/>
-          <p:cNvSpPr>
-            <a:spLocks noGrp="1"/>
-          </p:cNvSpPr>
-          <p:nvPr>
-            <p:ph type="hdr" sz="quarter" idx="15"/>
-          </p:nvPr>
-        </p:nvSpPr>
-        <p:spPr/>
-        <p:txBody>
-          <a:bodyPr/>
-          <a:lstStyle/>
-          <a:p>
-            <a:endParaRPr lang="en-US" dirty="0"/>
-          </a:p>
-        </p:txBody>
-      </p:sp>
-    </p:spTree>
-    <p:extLst>
-      <p:ext uri="{BB962C8B-B14F-4D97-AF65-F5344CB8AC3E}">
-        <p14:creationId xmlns:p14="http://schemas.microsoft.com/office/powerpoint/2010/main" val="3796014250"/>
-      </p:ext>
-    </p:extLst>
-  </p:cSld>
-  <p:clrMapOvr>
-    <a:masterClrMapping/>
-  </p:clrMapOvr>
-</p:notes>
-</file>
-
-<file path=ppt/notesSlides/notesSlide5.xml><?xml version="1.0" encoding="utf-8"?>
-<p:notes xmlns:a="http://schemas.openxmlformats.org/drawingml/2006/main" xmlns:r="http://schemas.openxmlformats.org/officeDocument/2006/relationships" xmlns:p="http://schemas.openxmlformats.org/presentationml/2006/main">
-  <p:cSld>
-    <p:spTree>
-      <p:nvGrpSpPr>
-        <p:cNvPr id="1" name=""/>
-        <p:cNvGrpSpPr/>
-        <p:nvPr/>
-      </p:nvGrpSpPr>
-      <p:grpSpPr>
-        <a:xfrm>
-          <a:off x="0" y="0"/>
-          <a:ext cx="0" cy="0"/>
-          <a:chOff x="0" y="0"/>
-          <a:chExt cx="0" cy="0"/>
-        </a:xfrm>
-      </p:grpSpPr>
-      <p:sp>
-        <p:nvSpPr>
-          <p:cNvPr id="2" name="Slide Image Placeholder 1"/>
-          <p:cNvSpPr>
-            <a:spLocks noGrp="1" noRot="1" noChangeAspect="1"/>
-          </p:cNvSpPr>
-          <p:nvPr>
-            <p:ph type="sldImg"/>
-          </p:nvPr>
-        </p:nvSpPr>
-        <p:spPr/>
-      </p:sp>
-      <p:sp>
-        <p:nvSpPr>
-          <p:cNvPr id="3" name="Notes Placeholder 2"/>
-          <p:cNvSpPr>
-            <a:spLocks noGrp="1"/>
-          </p:cNvSpPr>
-          <p:nvPr>
-            <p:ph type="body" idx="1"/>
-          </p:nvPr>
-        </p:nvSpPr>
-        <p:spPr/>
-        <p:txBody>
-          <a:bodyPr/>
-          <a:lstStyle/>
-          <a:p>
-            <a:endParaRPr lang="en-US" dirty="0"/>
-          </a:p>
-        </p:txBody>
-      </p:sp>
-      <p:sp>
-        <p:nvSpPr>
-          <p:cNvPr id="6" name="Slide Number Placeholder 5"/>
-          <p:cNvSpPr>
-            <a:spLocks noGrp="1"/>
-          </p:cNvSpPr>
-          <p:nvPr>
-            <p:ph type="sldNum" sz="quarter" idx="12"/>
-          </p:nvPr>
-        </p:nvSpPr>
-        <p:spPr/>
-        <p:txBody>
-          <a:bodyPr/>
-          <a:lstStyle/>
-          <a:p>
-            <a:fld id="{B4008EB6-D09E-4580-8CD6-DDB14511944F}" type="slidenum">
-              <a:rPr lang="en-US" smtClean="0"/>
-              <a:pPr/>
-              <a:t>6</a:t>
-            </a:fld>
-            <a:endParaRPr lang="en-US" dirty="0"/>
-          </a:p>
-        </p:txBody>
-      </p:sp>
-      <p:sp>
-        <p:nvSpPr>
-          <p:cNvPr id="10" name="Date Placeholder 9"/>
-          <p:cNvSpPr>
-            <a:spLocks noGrp="1"/>
-          </p:cNvSpPr>
-          <p:nvPr>
-            <p:ph type="dt" idx="13"/>
-          </p:nvPr>
-        </p:nvSpPr>
-        <p:spPr/>
-        <p:txBody>
-          <a:bodyPr/>
-          <a:lstStyle/>
-          <a:p>
-            <a:fld id="{6108602D-D426-4C00-B215-BFA18C076426}" type="datetime8">
-              <a:rPr lang="en-US" smtClean="0"/>
-              <a:t>6/9/2019 4:56 PM</a:t>
-            </a:fld>
-            <a:endParaRPr lang="en-US" dirty="0"/>
-          </a:p>
-        </p:txBody>
-      </p:sp>
-      <p:sp>
-        <p:nvSpPr>
-          <p:cNvPr id="4" name="Footer Placeholder 3"/>
-          <p:cNvSpPr>
-            <a:spLocks noGrp="1"/>
-          </p:cNvSpPr>
-          <p:nvPr>
-            <p:ph type="ftr" sz="quarter" idx="14"/>
-          </p:nvPr>
-        </p:nvSpPr>
-        <p:spPr/>
-        <p:txBody>
-          <a:bodyPr/>
-          <a:lstStyle/>
-          <a:p>
-            <a:pPr defTabSz="914099" eaLnBrk="0" hangingPunct="0"/>
-            <a:r>
-              <a:rPr lang="en-US" sz="400" dirty="0">
-                <a:gradFill>
-                  <a:gsLst>
-                    <a:gs pos="0">
-                      <a:prstClr val="black"/>
-                    </a:gs>
-                    <a:gs pos="100000">
-                      <a:prstClr val="black"/>
-                    </a:gs>
-                  </a:gsLst>
-                  <a:lin ang="5400000" scaled="0"/>
-                </a:gradFill>
-                <a:latin typeface="Segoe UI" pitchFamily="34" charset="0"/>
-                <a:ea typeface="Segoe UI" pitchFamily="34" charset="0"/>
-                <a:cs typeface="Segoe UI" pitchFamily="34" charset="0"/>
-              </a:rPr>
-              <a:t>© 2014 Microsoft Corporation. All rights reserved. MICROSOFT MAKES NO WARRANTIES, EXPRESS, IMPLIED OR STATUTORY, AS TO THE INFORMATION IN THIS PRESENTATION.</a:t>
-            </a:r>
-          </a:p>
-        </p:txBody>
-      </p:sp>
-      <p:sp>
-        <p:nvSpPr>
-          <p:cNvPr id="5" name="Header Placeholder 4"/>
-          <p:cNvSpPr>
-            <a:spLocks noGrp="1"/>
-          </p:cNvSpPr>
-          <p:nvPr>
-            <p:ph type="hdr" sz="quarter" idx="15"/>
-          </p:nvPr>
-        </p:nvSpPr>
-        <p:spPr/>
-        <p:txBody>
-          <a:bodyPr/>
-          <a:lstStyle/>
-          <a:p>
-            <a:endParaRPr lang="en-US" dirty="0"/>
-          </a:p>
-        </p:txBody>
-      </p:sp>
-    </p:spTree>
-    <p:extLst>
-      <p:ext uri="{BB962C8B-B14F-4D97-AF65-F5344CB8AC3E}">
-        <p14:creationId xmlns:p14="http://schemas.microsoft.com/office/powerpoint/2010/main" val="972969709"/>
-      </p:ext>
-    </p:extLst>
-  </p:cSld>
-  <p:clrMapOvr>
-    <a:masterClrMapping/>
-  </p:clrMapOvr>
-</p:notes>
-</file>
-
-<file path=ppt/notesSlides/notesSlide6.xml><?xml version="1.0" encoding="utf-8"?>
-<p:notes xmlns:a="http://schemas.openxmlformats.org/drawingml/2006/main" xmlns:r="http://schemas.openxmlformats.org/officeDocument/2006/relationships" xmlns:p="http://schemas.openxmlformats.org/presentationml/2006/main">
-  <p:cSld>
-    <p:spTree>
-      <p:nvGrpSpPr>
-        <p:cNvPr id="1" name=""/>
-        <p:cNvGrpSpPr/>
-        <p:nvPr/>
-      </p:nvGrpSpPr>
-      <p:grpSpPr>
-        <a:xfrm>
-          <a:off x="0" y="0"/>
-          <a:ext cx="0" cy="0"/>
-          <a:chOff x="0" y="0"/>
-          <a:chExt cx="0" cy="0"/>
-        </a:xfrm>
-      </p:grpSpPr>
-      <p:sp>
-        <p:nvSpPr>
-          <p:cNvPr id="2" name="Slide Image Placeholder 1"/>
-          <p:cNvSpPr>
-            <a:spLocks noGrp="1" noRot="1" noChangeAspect="1"/>
-          </p:cNvSpPr>
-          <p:nvPr>
-            <p:ph type="sldImg"/>
-          </p:nvPr>
-        </p:nvSpPr>
-        <p:spPr/>
-      </p:sp>
-      <p:sp>
-        <p:nvSpPr>
-          <p:cNvPr id="3" name="Notes Placeholder 2"/>
-          <p:cNvSpPr>
-            <a:spLocks noGrp="1"/>
-          </p:cNvSpPr>
-          <p:nvPr>
-            <p:ph type="body" idx="1"/>
-          </p:nvPr>
-        </p:nvSpPr>
-        <p:spPr/>
-        <p:txBody>
-          <a:bodyPr/>
-          <a:lstStyle/>
-          <a:p>
-            <a:endParaRPr lang="en-US" dirty="0"/>
-          </a:p>
-        </p:txBody>
-      </p:sp>
-      <p:sp>
-        <p:nvSpPr>
-          <p:cNvPr id="6" name="Slide Number Placeholder 5"/>
-          <p:cNvSpPr>
-            <a:spLocks noGrp="1"/>
-          </p:cNvSpPr>
-          <p:nvPr>
-            <p:ph type="sldNum" sz="quarter" idx="12"/>
-          </p:nvPr>
-        </p:nvSpPr>
-        <p:spPr/>
-        <p:txBody>
-          <a:bodyPr/>
-          <a:lstStyle/>
-          <a:p>
-            <a:fld id="{B4008EB6-D09E-4580-8CD6-DDB14511944F}" type="slidenum">
-              <a:rPr lang="en-US" smtClean="0"/>
-              <a:pPr/>
-              <a:t>7</a:t>
-            </a:fld>
-            <a:endParaRPr lang="en-US" dirty="0"/>
-          </a:p>
-        </p:txBody>
-      </p:sp>
-      <p:sp>
-        <p:nvSpPr>
-          <p:cNvPr id="10" name="Date Placeholder 9"/>
-          <p:cNvSpPr>
-            <a:spLocks noGrp="1"/>
-          </p:cNvSpPr>
-          <p:nvPr>
-            <p:ph type="dt" idx="13"/>
-          </p:nvPr>
-        </p:nvSpPr>
-        <p:spPr/>
-        <p:txBody>
-          <a:bodyPr/>
-          <a:lstStyle/>
-          <a:p>
-            <a:fld id="{6108602D-D426-4C00-B215-BFA18C076426}" type="datetime8">
-              <a:rPr lang="en-US" smtClean="0"/>
-              <a:t>6/9/2019 4:56 PM</a:t>
-            </a:fld>
-            <a:endParaRPr lang="en-US" dirty="0"/>
-          </a:p>
-        </p:txBody>
-      </p:sp>
-      <p:sp>
-        <p:nvSpPr>
-          <p:cNvPr id="4" name="Footer Placeholder 3"/>
-          <p:cNvSpPr>
-            <a:spLocks noGrp="1"/>
-          </p:cNvSpPr>
-          <p:nvPr>
-            <p:ph type="ftr" sz="quarter" idx="14"/>
-          </p:nvPr>
-        </p:nvSpPr>
-        <p:spPr/>
-        <p:txBody>
-          <a:bodyPr/>
-          <a:lstStyle/>
-          <a:p>
-            <a:pPr defTabSz="914099" eaLnBrk="0" hangingPunct="0"/>
-            <a:r>
-              <a:rPr lang="en-US" sz="400" dirty="0">
-                <a:gradFill>
-                  <a:gsLst>
-                    <a:gs pos="0">
-                      <a:prstClr val="black"/>
-                    </a:gs>
-                    <a:gs pos="100000">
-                      <a:prstClr val="black"/>
-                    </a:gs>
-                  </a:gsLst>
-                  <a:lin ang="5400000" scaled="0"/>
-                </a:gradFill>
-                <a:latin typeface="Segoe UI" pitchFamily="34" charset="0"/>
-                <a:ea typeface="Segoe UI" pitchFamily="34" charset="0"/>
-                <a:cs typeface="Segoe UI" pitchFamily="34" charset="0"/>
-              </a:rPr>
-              <a:t>© 2014 Microsoft Corporation. All rights reserved. MICROSOFT MAKES NO WARRANTIES, EXPRESS, IMPLIED OR STATUTORY, AS TO THE INFORMATION IN THIS PRESENTATION.</a:t>
-            </a:r>
-          </a:p>
-        </p:txBody>
-      </p:sp>
-      <p:sp>
-        <p:nvSpPr>
-          <p:cNvPr id="5" name="Header Placeholder 4"/>
-          <p:cNvSpPr>
-            <a:spLocks noGrp="1"/>
-          </p:cNvSpPr>
-          <p:nvPr>
-            <p:ph type="hdr" sz="quarter" idx="15"/>
-          </p:nvPr>
-        </p:nvSpPr>
-        <p:spPr/>
-        <p:txBody>
-          <a:bodyPr/>
-          <a:lstStyle/>
-          <a:p>
-            <a:endParaRPr lang="en-US" dirty="0"/>
-          </a:p>
-        </p:txBody>
-      </p:sp>
-    </p:spTree>
-    <p:extLst>
-      <p:ext uri="{BB962C8B-B14F-4D97-AF65-F5344CB8AC3E}">
-        <p14:creationId xmlns:p14="http://schemas.microsoft.com/office/powerpoint/2010/main" val="113851497"/>
-      </p:ext>
-    </p:extLst>
-  </p:cSld>
-  <p:clrMapOvr>
-    <a:masterClrMapping/>
-  </p:clrMapOvr>
-</p:notes>
-</file>
-
-<file path=ppt/notesSlides/notesSlide7.xml><?xml version="1.0" encoding="utf-8"?>
-<p:notes xmlns:a="http://schemas.openxmlformats.org/drawingml/2006/main" xmlns:r="http://schemas.openxmlformats.org/officeDocument/2006/relationships" xmlns:p="http://schemas.openxmlformats.org/presentationml/2006/main">
-  <p:cSld>
-    <p:spTree>
-      <p:nvGrpSpPr>
-        <p:cNvPr id="1" name=""/>
-        <p:cNvGrpSpPr/>
-        <p:nvPr/>
-      </p:nvGrpSpPr>
-      <p:grpSpPr>
-        <a:xfrm>
-          <a:off x="0" y="0"/>
-          <a:ext cx="0" cy="0"/>
-          <a:chOff x="0" y="0"/>
-          <a:chExt cx="0" cy="0"/>
-        </a:xfrm>
-      </p:grpSpPr>
-      <p:sp>
-        <p:nvSpPr>
-          <p:cNvPr id="2" name="Slide Image Placeholder 1"/>
-          <p:cNvSpPr>
-            <a:spLocks noGrp="1" noRot="1" noChangeAspect="1"/>
-          </p:cNvSpPr>
-          <p:nvPr>
-            <p:ph type="sldImg"/>
-          </p:nvPr>
-        </p:nvSpPr>
-        <p:spPr/>
-      </p:sp>
-      <p:sp>
-        <p:nvSpPr>
-          <p:cNvPr id="3" name="Notes Placeholder 2"/>
-          <p:cNvSpPr>
-            <a:spLocks noGrp="1"/>
-          </p:cNvSpPr>
-          <p:nvPr>
-            <p:ph type="body" idx="1"/>
-          </p:nvPr>
-        </p:nvSpPr>
-        <p:spPr/>
-        <p:txBody>
-          <a:bodyPr/>
-          <a:lstStyle/>
-          <a:p>
-            <a:endParaRPr lang="en-US" dirty="0"/>
-          </a:p>
-        </p:txBody>
-      </p:sp>
-      <p:sp>
-        <p:nvSpPr>
-          <p:cNvPr id="6" name="Slide Number Placeholder 5"/>
-          <p:cNvSpPr>
-            <a:spLocks noGrp="1"/>
-          </p:cNvSpPr>
-          <p:nvPr>
-            <p:ph type="sldNum" sz="quarter" idx="12"/>
-          </p:nvPr>
-        </p:nvSpPr>
-        <p:spPr/>
-        <p:txBody>
-          <a:bodyPr/>
-          <a:lstStyle/>
-          <a:p>
-            <a:fld id="{B4008EB6-D09E-4580-8CD6-DDB14511944F}" type="slidenum">
-              <a:rPr lang="en-US" smtClean="0"/>
-              <a:pPr/>
-              <a:t>8</a:t>
-            </a:fld>
-            <a:endParaRPr lang="en-US" dirty="0"/>
-          </a:p>
-        </p:txBody>
-      </p:sp>
-      <p:sp>
-        <p:nvSpPr>
-          <p:cNvPr id="10" name="Date Placeholder 9"/>
-          <p:cNvSpPr>
-            <a:spLocks noGrp="1"/>
-          </p:cNvSpPr>
-          <p:nvPr>
-            <p:ph type="dt" idx="13"/>
-          </p:nvPr>
-        </p:nvSpPr>
-        <p:spPr/>
-        <p:txBody>
-          <a:bodyPr/>
-          <a:lstStyle/>
-          <a:p>
-            <a:fld id="{6108602D-D426-4C00-B215-BFA18C076426}" type="datetime8">
-              <a:rPr lang="en-US" smtClean="0"/>
-              <a:t>6/9/2019 4:56 PM</a:t>
-            </a:fld>
-            <a:endParaRPr lang="en-US" dirty="0"/>
-          </a:p>
-        </p:txBody>
-      </p:sp>
-      <p:sp>
-        <p:nvSpPr>
-          <p:cNvPr id="4" name="Footer Placeholder 3"/>
-          <p:cNvSpPr>
-            <a:spLocks noGrp="1"/>
-          </p:cNvSpPr>
-          <p:nvPr>
-            <p:ph type="ftr" sz="quarter" idx="14"/>
-          </p:nvPr>
-        </p:nvSpPr>
-        <p:spPr/>
-        <p:txBody>
-          <a:bodyPr/>
-          <a:lstStyle/>
-          <a:p>
-            <a:pPr defTabSz="914099" eaLnBrk="0" hangingPunct="0"/>
-            <a:r>
-              <a:rPr lang="en-US" sz="400" dirty="0">
-                <a:gradFill>
-                  <a:gsLst>
-                    <a:gs pos="0">
-                      <a:prstClr val="black"/>
-                    </a:gs>
-                    <a:gs pos="100000">
-                      <a:prstClr val="black"/>
-                    </a:gs>
-                  </a:gsLst>
-                  <a:lin ang="5400000" scaled="0"/>
-                </a:gradFill>
-                <a:latin typeface="Segoe UI" pitchFamily="34" charset="0"/>
-                <a:ea typeface="Segoe UI" pitchFamily="34" charset="0"/>
-                <a:cs typeface="Segoe UI" pitchFamily="34" charset="0"/>
-              </a:rPr>
-              <a:t>© 2014 Microsoft Corporation. All rights reserved. MICROSOFT MAKES NO WARRANTIES, EXPRESS, IMPLIED OR STATUTORY, AS TO THE INFORMATION IN THIS PRESENTATION.</a:t>
-            </a:r>
-          </a:p>
-        </p:txBody>
-      </p:sp>
-      <p:sp>
-        <p:nvSpPr>
-          <p:cNvPr id="5" name="Header Placeholder 4"/>
-          <p:cNvSpPr>
-            <a:spLocks noGrp="1"/>
-          </p:cNvSpPr>
-          <p:nvPr>
-            <p:ph type="hdr" sz="quarter" idx="15"/>
-          </p:nvPr>
-        </p:nvSpPr>
-        <p:spPr/>
-        <p:txBody>
-          <a:bodyPr/>
-          <a:lstStyle/>
-          <a:p>
-            <a:endParaRPr lang="en-US" dirty="0"/>
-          </a:p>
-        </p:txBody>
-      </p:sp>
-    </p:spTree>
-    <p:extLst>
-      <p:ext uri="{BB962C8B-B14F-4D97-AF65-F5344CB8AC3E}">
-        <p14:creationId xmlns:p14="http://schemas.microsoft.com/office/powerpoint/2010/main" val="3349866229"/>
-      </p:ext>
-    </p:extLst>
-  </p:cSld>
-  <p:clrMapOvr>
-    <a:masterClrMapping/>
-  </p:clrMapOvr>
-</p:notes>
-</file>
-
-<file path=ppt/notesSlides/notesSlide8.xml><?xml version="1.0" encoding="utf-8"?>
-<p:notes xmlns:a="http://schemas.openxmlformats.org/drawingml/2006/main" xmlns:r="http://schemas.openxmlformats.org/officeDocument/2006/relationships" xmlns:p="http://schemas.openxmlformats.org/presentationml/2006/main">
-  <p:cSld>
-    <p:spTree>
-      <p:nvGrpSpPr>
-        <p:cNvPr id="1" name=""/>
-        <p:cNvGrpSpPr/>
-        <p:nvPr/>
-      </p:nvGrpSpPr>
-      <p:grpSpPr>
-        <a:xfrm>
-          <a:off x="0" y="0"/>
-          <a:ext cx="0" cy="0"/>
-          <a:chOff x="0" y="0"/>
-          <a:chExt cx="0" cy="0"/>
-        </a:xfrm>
-      </p:grpSpPr>
-      <p:sp>
-        <p:nvSpPr>
-          <p:cNvPr id="2" name="Slide Image Placeholder 1"/>
-          <p:cNvSpPr>
-            <a:spLocks noGrp="1" noRot="1" noChangeAspect="1"/>
-          </p:cNvSpPr>
-          <p:nvPr>
-            <p:ph type="sldImg"/>
-          </p:nvPr>
-        </p:nvSpPr>
-        <p:spPr/>
-      </p:sp>
-      <p:sp>
-        <p:nvSpPr>
-          <p:cNvPr id="3" name="Notes Placeholder 2"/>
-          <p:cNvSpPr>
-            <a:spLocks noGrp="1"/>
-          </p:cNvSpPr>
-          <p:nvPr>
-            <p:ph type="body" idx="1"/>
-          </p:nvPr>
-        </p:nvSpPr>
-        <p:spPr/>
-        <p:txBody>
-          <a:bodyPr/>
-          <a:lstStyle/>
-          <a:p>
-            <a:endParaRPr lang="en-US" dirty="0"/>
-          </a:p>
-        </p:txBody>
-      </p:sp>
-      <p:sp>
-        <p:nvSpPr>
-          <p:cNvPr id="6" name="Slide Number Placeholder 5"/>
-          <p:cNvSpPr>
-            <a:spLocks noGrp="1"/>
-          </p:cNvSpPr>
-          <p:nvPr>
-            <p:ph type="sldNum" sz="quarter" idx="12"/>
-          </p:nvPr>
-        </p:nvSpPr>
-        <p:spPr/>
-        <p:txBody>
-          <a:bodyPr/>
-          <a:lstStyle/>
-          <a:p>
-            <a:fld id="{B4008EB6-D09E-4580-8CD6-DDB14511944F}" type="slidenum">
-              <a:rPr lang="en-US" smtClean="0"/>
-              <a:pPr/>
-              <a:t>9</a:t>
-            </a:fld>
-            <a:endParaRPr lang="en-US" dirty="0"/>
-          </a:p>
-        </p:txBody>
-      </p:sp>
-      <p:sp>
-        <p:nvSpPr>
-          <p:cNvPr id="10" name="Date Placeholder 9"/>
-          <p:cNvSpPr>
-            <a:spLocks noGrp="1"/>
-          </p:cNvSpPr>
-          <p:nvPr>
-            <p:ph type="dt" idx="13"/>
-          </p:nvPr>
-        </p:nvSpPr>
-        <p:spPr/>
-        <p:txBody>
-          <a:bodyPr/>
-          <a:lstStyle/>
-          <a:p>
-            <a:fld id="{6108602D-D426-4C00-B215-BFA18C076426}" type="datetime8">
-              <a:rPr lang="en-US" smtClean="0"/>
-              <a:t>6/9/2019 4:56 PM</a:t>
+              <a:t>6/10/2019 1:26 PM</a:t>
             </a:fld>
             <a:endParaRPr lang="en-US" dirty="0"/>
           </a:p>
@@ -40927,44 +40259,6 @@
 </p:sld>
 </file>
 
-<file path=ppt/slides/slide10.xml><?xml version="1.0" encoding="utf-8"?>
-<p:sld xmlns:a="http://schemas.openxmlformats.org/drawingml/2006/main" xmlns:r="http://schemas.openxmlformats.org/officeDocument/2006/relationships" xmlns:p="http://schemas.openxmlformats.org/presentationml/2006/main">
-  <p:cSld>
-    <p:spTree>
-      <p:nvGrpSpPr>
-        <p:cNvPr id="1" name=""/>
-        <p:cNvGrpSpPr/>
-        <p:nvPr/>
-      </p:nvGrpSpPr>
-      <p:grpSpPr>
-        <a:xfrm>
-          <a:off x="0" y="0"/>
-          <a:ext cx="0" cy="0"/>
-          <a:chOff x="0" y="0"/>
-          <a:chExt cx="0" cy="0"/>
-        </a:xfrm>
-      </p:grpSpPr>
-    </p:spTree>
-    <p:extLst>
-      <p:ext uri="{BB962C8B-B14F-4D97-AF65-F5344CB8AC3E}">
-        <p14:creationId xmlns:p14="http://schemas.microsoft.com/office/powerpoint/2010/main" val="2137390358"/>
-      </p:ext>
-    </p:extLst>
-  </p:cSld>
-  <p:clrMapOvr>
-    <a:masterClrMapping/>
-  </p:clrMapOvr>
-  <mc:AlternateContent xmlns:mc="http://schemas.openxmlformats.org/markup-compatibility/2006" xmlns:p14="http://schemas.microsoft.com/office/powerpoint/2010/main">
-    <mc:Choice Requires="p14">
-      <p:transition p14:dur="10"/>
-    </mc:Choice>
-    <mc:Fallback xmlns="">
-      <p:transition/>
-    </mc:Fallback>
-  </mc:AlternateContent>
-</p:sld>
-</file>
-
 <file path=ppt/slides/slide2.xml><?xml version="1.0" encoding="utf-8"?>
 <p:sld xmlns:a="http://schemas.openxmlformats.org/drawingml/2006/main" xmlns:r="http://schemas.openxmlformats.org/officeDocument/2006/relationships" xmlns:p="http://schemas.openxmlformats.org/presentationml/2006/main">
   <p:cSld>
@@ -42168,323 +41462,16 @@
           <a:p>
             <a:r>
               <a:rPr lang="en-US" b="1" dirty="0"/>
-              <a:t>AND </a:t>
-            </a:r>
-            <a:r>
-              <a:rPr lang="en-US" b="1" dirty="0" err="1"/>
-              <a:t>and</a:t>
-            </a:r>
-            <a:r>
-              <a:rPr lang="en-US" b="1" dirty="0"/>
-              <a:t> OR operators can be combined for complex condition checks</a:t>
+              <a:t>Combining operators allows you to handle complex business rules in your code but must be tested very carefully to avoid introducing errors</a:t>
             </a:r>
             <a:endParaRPr lang="en-US" dirty="0"/>
-          </a:p>
-        </p:txBody>
-      </p:sp>
-      <p:sp>
-        <p:nvSpPr>
-          <p:cNvPr id="5" name="Text Placeholder 4"/>
-          <p:cNvSpPr>
-            <a:spLocks noGrp="1"/>
-          </p:cNvSpPr>
-          <p:nvPr>
-            <p:ph type="body" sz="quarter" idx="10"/>
-          </p:nvPr>
-        </p:nvSpPr>
-        <p:spPr>
-          <a:xfrm>
-            <a:off x="503236" y="1371600"/>
-            <a:ext cx="11566843" cy="5752344"/>
-          </a:xfrm>
-        </p:spPr>
-        <p:txBody>
-          <a:bodyPr/>
-          <a:lstStyle/>
-          <a:p>
-            <a:endParaRPr lang="en-CA" dirty="0"/>
-          </a:p>
-          <a:p>
-            <a:r>
-              <a:rPr lang="en-US" dirty="0"/>
-              <a:t>if level == </a:t>
-            </a:r>
-            <a:r>
-              <a:rPr lang="en-US" dirty="0">
-                <a:solidFill>
-                  <a:srgbClr val="C00000"/>
-                </a:solidFill>
-              </a:rPr>
-              <a:t>'Gold' </a:t>
-            </a:r>
-            <a:r>
-              <a:rPr lang="en-US" dirty="0"/>
-              <a:t>or level == </a:t>
-            </a:r>
-            <a:r>
-              <a:rPr lang="en-US" dirty="0">
-                <a:solidFill>
-                  <a:srgbClr val="C00000"/>
-                </a:solidFill>
-              </a:rPr>
-              <a:t>'Silver' </a:t>
-            </a:r>
-            <a:r>
-              <a:rPr lang="en-US" dirty="0"/>
-              <a:t>\</a:t>
-            </a:r>
-          </a:p>
-          <a:p>
-            <a:r>
-              <a:rPr lang="en-US" dirty="0"/>
-              <a:t>                   and payment == </a:t>
-            </a:r>
-            <a:r>
-              <a:rPr lang="en-US" dirty="0">
-                <a:solidFill>
-                  <a:srgbClr val="C00000"/>
-                </a:solidFill>
-              </a:rPr>
-              <a:t>'Complete'</a:t>
-            </a:r>
-            <a:r>
-              <a:rPr lang="en-US" dirty="0">
-                <a:solidFill>
-                  <a:srgbClr val="002050"/>
-                </a:solidFill>
-              </a:rPr>
-              <a:t>:</a:t>
-            </a:r>
-          </a:p>
-          <a:p>
-            <a:r>
-              <a:rPr lang="en-US" dirty="0"/>
-              <a:t>	</a:t>
-            </a:r>
-            <a:r>
-              <a:rPr lang="en-US" dirty="0" err="1"/>
-              <a:t>free_movie</a:t>
-            </a:r>
-            <a:r>
-              <a:rPr lang="en-US" dirty="0"/>
-              <a:t> = True</a:t>
-            </a:r>
-          </a:p>
-          <a:p>
-            <a:endParaRPr lang="en-US" dirty="0"/>
-          </a:p>
-          <a:p>
-            <a:r>
-              <a:rPr lang="en-US" dirty="0">
-                <a:solidFill>
-                  <a:schemeClr val="tx2"/>
-                </a:solidFill>
-              </a:rPr>
-              <a:t>#Later in your code</a:t>
-            </a:r>
-            <a:br>
-              <a:rPr lang="en-US" dirty="0"/>
-            </a:br>
-            <a:r>
-              <a:rPr lang="en-US" dirty="0"/>
-              <a:t>if </a:t>
-            </a:r>
-            <a:r>
-              <a:rPr lang="en-US" dirty="0" err="1"/>
-              <a:t>free_movie</a:t>
-            </a:r>
-            <a:r>
-              <a:rPr lang="en-US" dirty="0"/>
-              <a:t>:</a:t>
-            </a:r>
-          </a:p>
-          <a:p>
-            <a:r>
-              <a:rPr lang="en-US" dirty="0"/>
-              <a:t>	print(</a:t>
-            </a:r>
-            <a:r>
-              <a:rPr lang="en-US" dirty="0">
-                <a:solidFill>
-                  <a:srgbClr val="C00000"/>
-                </a:solidFill>
-              </a:rPr>
-              <a:t>'enjoy your movie'</a:t>
-            </a:r>
-            <a:r>
-              <a:rPr lang="en-US" dirty="0">
-                <a:solidFill>
-                  <a:srgbClr val="002050"/>
-                </a:solidFill>
-              </a:rPr>
-              <a:t>)</a:t>
-            </a:r>
-          </a:p>
-          <a:p>
-            <a:endParaRPr lang="en-CA" dirty="0"/>
-          </a:p>
-          <a:p>
-            <a:endParaRPr lang="en-CA" dirty="0"/>
-          </a:p>
-          <a:p>
-            <a:endParaRPr lang="en-CA" dirty="0"/>
-          </a:p>
-        </p:txBody>
-      </p:sp>
-      <p:sp>
-        <p:nvSpPr>
-          <p:cNvPr id="6" name="Rectangle 5">
-            <a:extLst>
-              <a:ext uri="{FF2B5EF4-FFF2-40B4-BE49-F238E27FC236}">
-                <a16:creationId xmlns:a16="http://schemas.microsoft.com/office/drawing/2014/main" id="{B176EF00-BB1D-4721-9EDA-1DD2E4715C2C}"/>
-              </a:ext>
-            </a:extLst>
-          </p:cNvPr>
-          <p:cNvSpPr/>
-          <p:nvPr/>
-        </p:nvSpPr>
-        <p:spPr bwMode="auto">
-          <a:xfrm>
-            <a:off x="7589837" y="3459943"/>
-            <a:ext cx="4724400" cy="2667000"/>
-          </a:xfrm>
-          <a:prstGeom prst="rect">
-            <a:avLst/>
-          </a:prstGeom>
-          <a:noFill/>
-          <a:ln w="38100">
-            <a:solidFill>
-              <a:srgbClr val="FF0000"/>
-            </a:solidFill>
-            <a:headEnd type="none" w="med" len="med"/>
-            <a:tailEnd type="none" w="med" len="med"/>
-          </a:ln>
-          <a:effectLst/>
-        </p:spPr>
-        <p:style>
-          <a:lnRef idx="1">
-            <a:schemeClr val="accent2"/>
-          </a:lnRef>
-          <a:fillRef idx="3">
-            <a:schemeClr val="accent2"/>
-          </a:fillRef>
-          <a:effectRef idx="2">
-            <a:schemeClr val="accent2"/>
-          </a:effectRef>
-          <a:fontRef idx="minor">
-            <a:schemeClr val="lt1"/>
-          </a:fontRef>
-        </p:style>
-        <p:txBody>
-          <a:bodyPr rot="0" spcFirstLastPara="0" vertOverflow="overflow" horzOverflow="overflow" vert="horz" wrap="square" lIns="182880" tIns="146304" rIns="182880" bIns="146304" numCol="1" spcCol="0" rtlCol="0" fromWordArt="0" anchor="t" anchorCtr="0" forceAA="0" compatLnSpc="1">
-            <a:prstTxWarp prst="textNoShape">
-              <a:avLst/>
-            </a:prstTxWarp>
-            <a:noAutofit/>
-          </a:bodyPr>
-          <a:lstStyle/>
-          <a:p>
-            <a:pPr algn="ctr" defTabSz="932472" fontAlgn="base">
-              <a:lnSpc>
-                <a:spcPct val="90000"/>
-              </a:lnSpc>
-              <a:spcBef>
-                <a:spcPct val="0"/>
-              </a:spcBef>
-              <a:spcAft>
-                <a:spcPct val="0"/>
-              </a:spcAft>
-            </a:pPr>
-            <a:r>
-              <a:rPr lang="en-CA" sz="2400" dirty="0">
-                <a:solidFill>
-                  <a:srgbClr val="FF0000"/>
-                </a:solidFill>
-                <a:ea typeface="Segoe UI" pitchFamily="34" charset="0"/>
-                <a:cs typeface="Segoe UI" pitchFamily="34" charset="0"/>
-              </a:rPr>
-              <a:t>Criteria to access free movie</a:t>
-            </a:r>
-          </a:p>
-          <a:p>
-            <a:pPr algn="ctr" defTabSz="932472" fontAlgn="base">
-              <a:lnSpc>
-                <a:spcPct val="90000"/>
-              </a:lnSpc>
-              <a:spcBef>
-                <a:spcPct val="0"/>
-              </a:spcBef>
-              <a:spcAft>
-                <a:spcPct val="0"/>
-              </a:spcAft>
-            </a:pPr>
-            <a:r>
-              <a:rPr lang="en-CA" sz="2400" dirty="0">
-                <a:solidFill>
-                  <a:srgbClr val="FF0000"/>
-                </a:solidFill>
-                <a:ea typeface="Segoe UI" pitchFamily="34" charset="0"/>
-                <a:cs typeface="Segoe UI" pitchFamily="34" charset="0"/>
-              </a:rPr>
-              <a:t> </a:t>
-            </a:r>
-          </a:p>
-          <a:p>
-            <a:pPr marL="342900" indent="-342900" defTabSz="932472" fontAlgn="base">
-              <a:lnSpc>
-                <a:spcPct val="90000"/>
-              </a:lnSpc>
-              <a:spcBef>
-                <a:spcPct val="0"/>
-              </a:spcBef>
-              <a:spcAft>
-                <a:spcPct val="0"/>
-              </a:spcAft>
-              <a:buFont typeface="Arial" panose="020B0604020202020204" pitchFamily="34" charset="0"/>
-              <a:buChar char="•"/>
-            </a:pPr>
-            <a:r>
-              <a:rPr lang="en-CA" sz="2400" dirty="0">
-                <a:solidFill>
-                  <a:srgbClr val="FF0000"/>
-                </a:solidFill>
-                <a:ea typeface="Segoe UI" pitchFamily="34" charset="0"/>
-                <a:cs typeface="Segoe UI" pitchFamily="34" charset="0"/>
-              </a:rPr>
-              <a:t>Subscription payments are completed</a:t>
-            </a:r>
-          </a:p>
-          <a:p>
-            <a:pPr marL="342900" indent="-342900" defTabSz="932472" fontAlgn="base">
-              <a:lnSpc>
-                <a:spcPct val="90000"/>
-              </a:lnSpc>
-              <a:spcBef>
-                <a:spcPct val="0"/>
-              </a:spcBef>
-              <a:spcAft>
-                <a:spcPct val="0"/>
-              </a:spcAft>
-              <a:buFont typeface="Arial" panose="020B0604020202020204" pitchFamily="34" charset="0"/>
-              <a:buChar char="•"/>
-            </a:pPr>
-            <a:r>
-              <a:rPr lang="en-CA" sz="2400" dirty="0">
-                <a:solidFill>
-                  <a:srgbClr val="FF0000"/>
-                </a:solidFill>
-                <a:ea typeface="Segoe UI" pitchFamily="34" charset="0"/>
-                <a:cs typeface="Segoe UI" pitchFamily="34" charset="0"/>
-              </a:rPr>
-              <a:t>Subscription level is silver or gold</a:t>
-            </a:r>
           </a:p>
         </p:txBody>
       </p:sp>
     </p:spTree>
     <p:extLst>
       <p:ext uri="{BB962C8B-B14F-4D97-AF65-F5344CB8AC3E}">
-        <p14:creationId xmlns:p14="http://schemas.microsoft.com/office/powerpoint/2010/main" val="2310835267"/>
+        <p14:creationId xmlns:p14="http://schemas.microsoft.com/office/powerpoint/2010/main" val="4000133069"/>
       </p:ext>
     </p:extLst>
   </p:cSld>
@@ -42499,212 +41486,6 @@
       <p:transition/>
     </mc:Fallback>
   </mc:AlternateContent>
-  <p:timing>
-    <p:tnLst>
-      <p:par>
-        <p:cTn id="1" dur="indefinite" restart="never" nodeType="tmRoot">
-          <p:childTnLst>
-            <p:seq concurrent="1" nextAc="seek">
-              <p:cTn id="2" dur="indefinite" nodeType="mainSeq">
-                <p:childTnLst>
-                  <p:par>
-                    <p:cTn id="3" fill="hold">
-                      <p:stCondLst>
-                        <p:cond delay="indefinite"/>
-                      </p:stCondLst>
-                      <p:childTnLst>
-                        <p:par>
-                          <p:cTn id="4" fill="hold">
-                            <p:stCondLst>
-                              <p:cond delay="0"/>
-                            </p:stCondLst>
-                            <p:childTnLst>
-                              <p:par>
-                                <p:cTn id="5" presetID="1" presetClass="entr" presetSubtype="0" fill="hold" grpId="0" nodeType="clickEffect">
-                                  <p:stCondLst>
-                                    <p:cond delay="0"/>
-                                  </p:stCondLst>
-                                  <p:childTnLst>
-                                    <p:set>
-                                      <p:cBhvr>
-                                        <p:cTn id="6" dur="1" fill="hold">
-                                          <p:stCondLst>
-                                            <p:cond delay="0"/>
-                                          </p:stCondLst>
-                                        </p:cTn>
-                                        <p:tgtEl>
-                                          <p:spTgt spid="5">
-                                            <p:txEl>
-                                              <p:pRg st="1" end="1"/>
-                                            </p:txEl>
-                                          </p:spTgt>
-                                        </p:tgtEl>
-                                        <p:attrNameLst>
-                                          <p:attrName>style.visibility</p:attrName>
-                                        </p:attrNameLst>
-                                      </p:cBhvr>
-                                      <p:to>
-                                        <p:strVal val="visible"/>
-                                      </p:to>
-                                    </p:set>
-                                  </p:childTnLst>
-                                </p:cTn>
-                              </p:par>
-                              <p:par>
-                                <p:cTn id="7" presetID="1" presetClass="entr" presetSubtype="0" fill="hold" grpId="0" nodeType="withEffect">
-                                  <p:stCondLst>
-                                    <p:cond delay="0"/>
-                                  </p:stCondLst>
-                                  <p:childTnLst>
-                                    <p:set>
-                                      <p:cBhvr>
-                                        <p:cTn id="8" dur="1" fill="hold">
-                                          <p:stCondLst>
-                                            <p:cond delay="0"/>
-                                          </p:stCondLst>
-                                        </p:cTn>
-                                        <p:tgtEl>
-                                          <p:spTgt spid="5">
-                                            <p:txEl>
-                                              <p:pRg st="2" end="2"/>
-                                            </p:txEl>
-                                          </p:spTgt>
-                                        </p:tgtEl>
-                                        <p:attrNameLst>
-                                          <p:attrName>style.visibility</p:attrName>
-                                        </p:attrNameLst>
-                                      </p:cBhvr>
-                                      <p:to>
-                                        <p:strVal val="visible"/>
-                                      </p:to>
-                                    </p:set>
-                                  </p:childTnLst>
-                                </p:cTn>
-                              </p:par>
-                              <p:par>
-                                <p:cTn id="9" presetID="1" presetClass="entr" presetSubtype="0" fill="hold" grpId="0" nodeType="withEffect">
-                                  <p:stCondLst>
-                                    <p:cond delay="0"/>
-                                  </p:stCondLst>
-                                  <p:childTnLst>
-                                    <p:set>
-                                      <p:cBhvr>
-                                        <p:cTn id="10" dur="1" fill="hold">
-                                          <p:stCondLst>
-                                            <p:cond delay="0"/>
-                                          </p:stCondLst>
-                                        </p:cTn>
-                                        <p:tgtEl>
-                                          <p:spTgt spid="5">
-                                            <p:txEl>
-                                              <p:pRg st="3" end="3"/>
-                                            </p:txEl>
-                                          </p:spTgt>
-                                        </p:tgtEl>
-                                        <p:attrNameLst>
-                                          <p:attrName>style.visibility</p:attrName>
-                                        </p:attrNameLst>
-                                      </p:cBhvr>
-                                      <p:to>
-                                        <p:strVal val="visible"/>
-                                      </p:to>
-                                    </p:set>
-                                  </p:childTnLst>
-                                </p:cTn>
-                              </p:par>
-                              <p:par>
-                                <p:cTn id="11" presetID="1" presetClass="entr" presetSubtype="0" fill="hold" grpId="0" nodeType="withEffect">
-                                  <p:stCondLst>
-                                    <p:cond delay="0"/>
-                                  </p:stCondLst>
-                                  <p:childTnLst>
-                                    <p:set>
-                                      <p:cBhvr>
-                                        <p:cTn id="12" dur="1" fill="hold">
-                                          <p:stCondLst>
-                                            <p:cond delay="0"/>
-                                          </p:stCondLst>
-                                        </p:cTn>
-                                        <p:tgtEl>
-                                          <p:spTgt spid="5">
-                                            <p:txEl>
-                                              <p:pRg st="5" end="5"/>
-                                            </p:txEl>
-                                          </p:spTgt>
-                                        </p:tgtEl>
-                                        <p:attrNameLst>
-                                          <p:attrName>style.visibility</p:attrName>
-                                        </p:attrNameLst>
-                                      </p:cBhvr>
-                                      <p:to>
-                                        <p:strVal val="visible"/>
-                                      </p:to>
-                                    </p:set>
-                                  </p:childTnLst>
-                                </p:cTn>
-                              </p:par>
-                              <p:par>
-                                <p:cTn id="13" presetID="1" presetClass="entr" presetSubtype="0" fill="hold" grpId="0" nodeType="withEffect">
-                                  <p:stCondLst>
-                                    <p:cond delay="0"/>
-                                  </p:stCondLst>
-                                  <p:childTnLst>
-                                    <p:set>
-                                      <p:cBhvr>
-                                        <p:cTn id="14" dur="1" fill="hold">
-                                          <p:stCondLst>
-                                            <p:cond delay="0"/>
-                                          </p:stCondLst>
-                                        </p:cTn>
-                                        <p:tgtEl>
-                                          <p:spTgt spid="5">
-                                            <p:txEl>
-                                              <p:pRg st="6" end="6"/>
-                                            </p:txEl>
-                                          </p:spTgt>
-                                        </p:tgtEl>
-                                        <p:attrNameLst>
-                                          <p:attrName>style.visibility</p:attrName>
-                                        </p:attrNameLst>
-                                      </p:cBhvr>
-                                      <p:to>
-                                        <p:strVal val="visible"/>
-                                      </p:to>
-                                    </p:set>
-                                  </p:childTnLst>
-                                </p:cTn>
-                              </p:par>
-                            </p:childTnLst>
-                          </p:cTn>
-                        </p:par>
-                      </p:childTnLst>
-                    </p:cTn>
-                  </p:par>
-                </p:childTnLst>
-              </p:cTn>
-              <p:prevCondLst>
-                <p:cond evt="onPrev" delay="0">
-                  <p:tgtEl>
-                    <p:sldTgt/>
-                  </p:tgtEl>
-                </p:cond>
-              </p:prevCondLst>
-              <p:nextCondLst>
-                <p:cond evt="onNext" delay="0">
-                  <p:tgtEl>
-                    <p:sldTgt/>
-                  </p:tgtEl>
-                </p:cond>
-              </p:nextCondLst>
-            </p:seq>
-          </p:childTnLst>
-        </p:cTn>
-      </p:par>
-    </p:tnLst>
-    <p:bldLst>
-      <p:bldP spid="5" grpId="0" uiExpand="1" build="p"/>
-    </p:bldLst>
-  </p:timing>
 </p:sld>
 </file>
 
@@ -42725,1245 +41506,10 @@
           <a:chExt cx="0" cy="0"/>
         </a:xfrm>
       </p:grpSpPr>
-      <p:sp>
-        <p:nvSpPr>
-          <p:cNvPr id="4" name="Title 3"/>
-          <p:cNvSpPr>
-            <a:spLocks noGrp="1"/>
-          </p:cNvSpPr>
-          <p:nvPr>
-            <p:ph type="title"/>
-          </p:nvPr>
-        </p:nvSpPr>
-        <p:spPr/>
-        <p:txBody>
-          <a:bodyPr/>
-          <a:lstStyle/>
-          <a:p>
-            <a:r>
-              <a:rPr lang="en-US" b="1" dirty="0"/>
-              <a:t>Always test combined conditions carefully! </a:t>
-            </a:r>
-            <a:br>
-              <a:rPr lang="en-US" b="1" dirty="0"/>
-            </a:br>
-            <a:r>
-              <a:rPr lang="en-US" b="1" dirty="0"/>
-              <a:t>Try every possible combination</a:t>
-            </a:r>
-            <a:endParaRPr lang="en-US" dirty="0"/>
-          </a:p>
-        </p:txBody>
-      </p:sp>
-      <p:graphicFrame>
-        <p:nvGraphicFramePr>
-          <p:cNvPr id="7" name="Table 6">
-            <a:extLst>
-              <a:ext uri="{FF2B5EF4-FFF2-40B4-BE49-F238E27FC236}">
-                <a16:creationId xmlns:a16="http://schemas.microsoft.com/office/drawing/2014/main" id="{EE45B350-66EA-4D56-9AAE-07454726398A}"/>
-              </a:ext>
-            </a:extLst>
-          </p:cNvPr>
-          <p:cNvGraphicFramePr>
-            <a:graphicFrameLocks noGrp="1"/>
-          </p:cNvGraphicFramePr>
-          <p:nvPr>
-            <p:extLst>
-              <p:ext uri="{D42A27DB-BD31-4B8C-83A1-F6EECF244321}">
-                <p14:modId xmlns:p14="http://schemas.microsoft.com/office/powerpoint/2010/main" val="227218314"/>
-              </p:ext>
-            </p:extLst>
-          </p:nvPr>
-        </p:nvGraphicFramePr>
-        <p:xfrm>
-          <a:off x="1570038" y="1997011"/>
-          <a:ext cx="6400800" cy="1922050"/>
-        </p:xfrm>
-        <a:graphic>
-          <a:graphicData uri="http://schemas.openxmlformats.org/drawingml/2006/table">
-            <a:tbl>
-              <a:tblPr firstRow="1" bandRow="1">
-                <a:tableStyleId>{21E4AEA4-8DFA-4A89-87EB-49C32662AFE0}</a:tableStyleId>
-              </a:tblPr>
-              <a:tblGrid>
-                <a:gridCol w="1461595">
-                  <a:extLst>
-                    <a:ext uri="{9D8B030D-6E8A-4147-A177-3AD203B41FA5}">
-                      <a16:colId xmlns:a16="http://schemas.microsoft.com/office/drawing/2014/main" val="3223346213"/>
-                    </a:ext>
-                  </a:extLst>
-                </a:gridCol>
-                <a:gridCol w="2079961">
-                  <a:extLst>
-                    <a:ext uri="{9D8B030D-6E8A-4147-A177-3AD203B41FA5}">
-                      <a16:colId xmlns:a16="http://schemas.microsoft.com/office/drawing/2014/main" val="50370450"/>
-                    </a:ext>
-                  </a:extLst>
-                </a:gridCol>
-                <a:gridCol w="2859244">
-                  <a:extLst>
-                    <a:ext uri="{9D8B030D-6E8A-4147-A177-3AD203B41FA5}">
-                      <a16:colId xmlns:a16="http://schemas.microsoft.com/office/drawing/2014/main" val="3166131026"/>
-                    </a:ext>
-                  </a:extLst>
-                </a:gridCol>
-              </a:tblGrid>
-              <a:tr h="384410">
-                <a:tc>
-                  <a:txBody>
-                    <a:bodyPr/>
-                    <a:lstStyle/>
-                    <a:p>
-                      <a:r>
-                        <a:rPr lang="en-CA" dirty="0"/>
-                        <a:t>Level</a:t>
-                      </a:r>
-                    </a:p>
-                  </a:txBody>
-                  <a:tcPr/>
-                </a:tc>
-                <a:tc>
-                  <a:txBody>
-                    <a:bodyPr/>
-                    <a:lstStyle/>
-                    <a:p>
-                      <a:r>
-                        <a:rPr lang="en-CA" dirty="0"/>
-                        <a:t>Payment</a:t>
-                      </a:r>
-                    </a:p>
-                  </a:txBody>
-                  <a:tcPr/>
-                </a:tc>
-                <a:tc>
-                  <a:txBody>
-                    <a:bodyPr/>
-                    <a:lstStyle/>
-                    <a:p>
-                      <a:r>
-                        <a:rPr lang="en-CA" dirty="0" err="1"/>
-                        <a:t>FreeMovie</a:t>
-                      </a:r>
-                      <a:endParaRPr lang="en-CA" dirty="0"/>
-                    </a:p>
-                  </a:txBody>
-                  <a:tcPr/>
-                </a:tc>
-                <a:extLst>
-                  <a:ext uri="{0D108BD9-81ED-4DB2-BD59-A6C34878D82A}">
-                    <a16:rowId xmlns:a16="http://schemas.microsoft.com/office/drawing/2014/main" val="1113786940"/>
-                  </a:ext>
-                </a:extLst>
-              </a:tr>
-              <a:tr h="384410">
-                <a:tc>
-                  <a:txBody>
-                    <a:bodyPr/>
-                    <a:lstStyle/>
-                    <a:p>
-                      <a:r>
-                        <a:rPr lang="en-CA" b="1" dirty="0"/>
-                        <a:t>Gold</a:t>
-                      </a:r>
-                    </a:p>
-                  </a:txBody>
-                  <a:tcPr/>
-                </a:tc>
-                <a:tc>
-                  <a:txBody>
-                    <a:bodyPr/>
-                    <a:lstStyle/>
-                    <a:p>
-                      <a:r>
-                        <a:rPr lang="en-CA" b="1" dirty="0"/>
-                        <a:t>Complete</a:t>
-                      </a:r>
-                    </a:p>
-                  </a:txBody>
-                  <a:tcPr/>
-                </a:tc>
-                <a:tc>
-                  <a:txBody>
-                    <a:bodyPr/>
-                    <a:lstStyle/>
-                    <a:p>
-                      <a:r>
-                        <a:rPr lang="en-CA" b="1" dirty="0"/>
-                        <a:t>TRUE</a:t>
-                      </a:r>
-                    </a:p>
-                  </a:txBody>
-                  <a:tcPr/>
-                </a:tc>
-                <a:extLst>
-                  <a:ext uri="{0D108BD9-81ED-4DB2-BD59-A6C34878D82A}">
-                    <a16:rowId xmlns:a16="http://schemas.microsoft.com/office/drawing/2014/main" val="3350059559"/>
-                  </a:ext>
-                </a:extLst>
-              </a:tr>
-              <a:tr h="384410">
-                <a:tc>
-                  <a:txBody>
-                    <a:bodyPr/>
-                    <a:lstStyle/>
-                    <a:p>
-                      <a:r>
-                        <a:rPr lang="en-CA" b="1" dirty="0"/>
-                        <a:t>Silver</a:t>
-                      </a:r>
-                    </a:p>
-                  </a:txBody>
-                  <a:tcPr/>
-                </a:tc>
-                <a:tc>
-                  <a:txBody>
-                    <a:bodyPr/>
-                    <a:lstStyle/>
-                    <a:p>
-                      <a:r>
-                        <a:rPr lang="en-CA" b="1" dirty="0"/>
-                        <a:t>Complete</a:t>
-                      </a:r>
-                    </a:p>
-                  </a:txBody>
-                  <a:tcPr/>
-                </a:tc>
-                <a:tc>
-                  <a:txBody>
-                    <a:bodyPr/>
-                    <a:lstStyle/>
-                    <a:p>
-                      <a:r>
-                        <a:rPr lang="en-CA" b="1" dirty="0"/>
-                        <a:t>TRUE</a:t>
-                      </a:r>
-                    </a:p>
-                  </a:txBody>
-                  <a:tcPr/>
-                </a:tc>
-                <a:extLst>
-                  <a:ext uri="{0D108BD9-81ED-4DB2-BD59-A6C34878D82A}">
-                    <a16:rowId xmlns:a16="http://schemas.microsoft.com/office/drawing/2014/main" val="1555637487"/>
-                  </a:ext>
-                </a:extLst>
-              </a:tr>
-              <a:tr h="384410">
-                <a:tc>
-                  <a:txBody>
-                    <a:bodyPr/>
-                    <a:lstStyle/>
-                    <a:p>
-                      <a:r>
-                        <a:rPr lang="en-CA" b="1" dirty="0"/>
-                        <a:t>Silver</a:t>
-                      </a:r>
-                    </a:p>
-                  </a:txBody>
-                  <a:tcPr/>
-                </a:tc>
-                <a:tc>
-                  <a:txBody>
-                    <a:bodyPr/>
-                    <a:lstStyle/>
-                    <a:p>
-                      <a:r>
-                        <a:rPr lang="en-CA" b="1" dirty="0"/>
-                        <a:t>Due</a:t>
-                      </a:r>
-                    </a:p>
-                  </a:txBody>
-                  <a:tcPr/>
-                </a:tc>
-                <a:tc>
-                  <a:txBody>
-                    <a:bodyPr/>
-                    <a:lstStyle/>
-                    <a:p>
-                      <a:r>
-                        <a:rPr lang="en-CA" b="1" dirty="0"/>
-                        <a:t>FALSE</a:t>
-                      </a:r>
-                    </a:p>
-                  </a:txBody>
-                  <a:tcPr/>
-                </a:tc>
-                <a:extLst>
-                  <a:ext uri="{0D108BD9-81ED-4DB2-BD59-A6C34878D82A}">
-                    <a16:rowId xmlns:a16="http://schemas.microsoft.com/office/drawing/2014/main" val="73967548"/>
-                  </a:ext>
-                </a:extLst>
-              </a:tr>
-              <a:tr h="384410">
-                <a:tc>
-                  <a:txBody>
-                    <a:bodyPr/>
-                    <a:lstStyle/>
-                    <a:p>
-                      <a:r>
-                        <a:rPr lang="en-CA" b="1" dirty="0"/>
-                        <a:t>Gold</a:t>
-                      </a:r>
-                    </a:p>
-                  </a:txBody>
-                  <a:tcPr/>
-                </a:tc>
-                <a:tc>
-                  <a:txBody>
-                    <a:bodyPr/>
-                    <a:lstStyle/>
-                    <a:p>
-                      <a:r>
-                        <a:rPr lang="en-CA" b="1" dirty="0"/>
-                        <a:t>Due</a:t>
-                      </a:r>
-                    </a:p>
-                  </a:txBody>
-                  <a:tcPr/>
-                </a:tc>
-                <a:tc>
-                  <a:txBody>
-                    <a:bodyPr/>
-                    <a:lstStyle/>
-                    <a:p>
-                      <a:r>
-                        <a:rPr lang="en-CA" b="1" dirty="0"/>
-                        <a:t>TRUE</a:t>
-                      </a:r>
-                    </a:p>
-                  </a:txBody>
-                  <a:tcPr/>
-                </a:tc>
-                <a:extLst>
-                  <a:ext uri="{0D108BD9-81ED-4DB2-BD59-A6C34878D82A}">
-                    <a16:rowId xmlns:a16="http://schemas.microsoft.com/office/drawing/2014/main" val="3120992454"/>
-                  </a:ext>
-                </a:extLst>
-              </a:tr>
-            </a:tbl>
-          </a:graphicData>
-        </a:graphic>
-      </p:graphicFrame>
-      <p:sp>
-        <p:nvSpPr>
-          <p:cNvPr id="5" name="Text Placeholder 4">
-            <a:extLst>
-              <a:ext uri="{FF2B5EF4-FFF2-40B4-BE49-F238E27FC236}">
-                <a16:creationId xmlns:a16="http://schemas.microsoft.com/office/drawing/2014/main" id="{73CB4E60-336D-4DDD-A0A0-A7D054B2CC59}"/>
-              </a:ext>
-            </a:extLst>
-          </p:cNvPr>
-          <p:cNvSpPr>
-            <a:spLocks noGrp="1"/>
-          </p:cNvSpPr>
-          <p:nvPr>
-            <p:ph type="body" sz="quarter" idx="10"/>
-          </p:nvPr>
-        </p:nvSpPr>
-        <p:spPr>
-          <a:xfrm>
-            <a:off x="441960" y="4123913"/>
-            <a:ext cx="11566843" cy="4268861"/>
-          </a:xfrm>
-        </p:spPr>
-        <p:txBody>
-          <a:bodyPr/>
-          <a:lstStyle/>
-          <a:p>
-            <a:endParaRPr lang="en-CA" dirty="0"/>
-          </a:p>
-          <a:p>
-            <a:r>
-              <a:rPr lang="en-US" dirty="0"/>
-              <a:t>if level == </a:t>
-            </a:r>
-            <a:r>
-              <a:rPr lang="en-US" dirty="0">
-                <a:solidFill>
-                  <a:srgbClr val="C00000"/>
-                </a:solidFill>
-              </a:rPr>
-              <a:t>'Gold' </a:t>
-            </a:r>
-            <a:r>
-              <a:rPr lang="en-US" dirty="0"/>
-              <a:t>or level == </a:t>
-            </a:r>
-            <a:r>
-              <a:rPr lang="en-US" dirty="0">
-                <a:solidFill>
-                  <a:srgbClr val="C00000"/>
-                </a:solidFill>
-              </a:rPr>
-              <a:t>'Silver' </a:t>
-            </a:r>
-            <a:r>
-              <a:rPr lang="en-US" dirty="0"/>
-              <a:t>\</a:t>
-            </a:r>
-          </a:p>
-          <a:p>
-            <a:r>
-              <a:rPr lang="en-US" dirty="0"/>
-              <a:t>                   and payment == </a:t>
-            </a:r>
-            <a:r>
-              <a:rPr lang="en-US" dirty="0">
-                <a:solidFill>
-                  <a:srgbClr val="C00000"/>
-                </a:solidFill>
-              </a:rPr>
-              <a:t>'Complete'</a:t>
-            </a:r>
-            <a:r>
-              <a:rPr lang="en-US" dirty="0">
-                <a:solidFill>
-                  <a:srgbClr val="002050"/>
-                </a:solidFill>
-              </a:rPr>
-              <a:t>:</a:t>
-            </a:r>
-          </a:p>
-          <a:p>
-            <a:r>
-              <a:rPr lang="en-US" dirty="0"/>
-              <a:t>	</a:t>
-            </a:r>
-            <a:r>
-              <a:rPr lang="en-US" dirty="0" err="1"/>
-              <a:t>free_movie</a:t>
-            </a:r>
-            <a:r>
-              <a:rPr lang="en-US" dirty="0"/>
-              <a:t> = True</a:t>
-            </a:r>
-          </a:p>
-          <a:p>
-            <a:endParaRPr lang="en-US" dirty="0"/>
-          </a:p>
-          <a:p>
-            <a:endParaRPr lang="en-CA" dirty="0"/>
-          </a:p>
-          <a:p>
-            <a:endParaRPr lang="en-CA" dirty="0"/>
-          </a:p>
-          <a:p>
-            <a:endParaRPr lang="en-CA" dirty="0"/>
-          </a:p>
-        </p:txBody>
-      </p:sp>
-      <p:sp>
-        <p:nvSpPr>
-          <p:cNvPr id="3" name="Arrow: Right 2">
-            <a:extLst>
-              <a:ext uri="{FF2B5EF4-FFF2-40B4-BE49-F238E27FC236}">
-                <a16:creationId xmlns:a16="http://schemas.microsoft.com/office/drawing/2014/main" id="{124FDF07-4154-4A76-A051-86E9B5EF7BDA}"/>
-              </a:ext>
-            </a:extLst>
-          </p:cNvPr>
-          <p:cNvSpPr/>
-          <p:nvPr/>
-        </p:nvSpPr>
-        <p:spPr bwMode="auto">
-          <a:xfrm rot="10800000">
-            <a:off x="6675437" y="3479385"/>
-            <a:ext cx="914400" cy="474251"/>
-          </a:xfrm>
-          <a:prstGeom prst="rightArrow">
-            <a:avLst/>
-          </a:prstGeom>
-          <a:solidFill>
-            <a:srgbClr val="FF0000"/>
-          </a:solidFill>
-          <a:ln>
-            <a:noFill/>
-            <a:headEnd type="none" w="med" len="med"/>
-            <a:tailEnd type="none" w="med" len="med"/>
-          </a:ln>
-          <a:effectLst/>
-        </p:spPr>
-        <p:style>
-          <a:lnRef idx="1">
-            <a:schemeClr val="accent2"/>
-          </a:lnRef>
-          <a:fillRef idx="3">
-            <a:schemeClr val="accent2"/>
-          </a:fillRef>
-          <a:effectRef idx="2">
-            <a:schemeClr val="accent2"/>
-          </a:effectRef>
-          <a:fontRef idx="minor">
-            <a:schemeClr val="lt1"/>
-          </a:fontRef>
-        </p:style>
-        <p:txBody>
-          <a:bodyPr rot="0" spcFirstLastPara="0" vertOverflow="overflow" horzOverflow="overflow" vert="horz" wrap="square" lIns="182880" tIns="146304" rIns="182880" bIns="146304" numCol="1" spcCol="0" rtlCol="0" fromWordArt="0" anchor="t" anchorCtr="0" forceAA="0" compatLnSpc="1">
-            <a:prstTxWarp prst="textNoShape">
-              <a:avLst/>
-            </a:prstTxWarp>
-            <a:noAutofit/>
-          </a:bodyPr>
-          <a:lstStyle/>
-          <a:p>
-            <a:pPr algn="ctr" defTabSz="932472" fontAlgn="base">
-              <a:lnSpc>
-                <a:spcPct val="90000"/>
-              </a:lnSpc>
-              <a:spcBef>
-                <a:spcPct val="0"/>
-              </a:spcBef>
-              <a:spcAft>
-                <a:spcPct val="0"/>
-              </a:spcAft>
-            </a:pPr>
-            <a:endParaRPr lang="en-CA" sz="2400" dirty="0" err="1">
-              <a:gradFill>
-                <a:gsLst>
-                  <a:gs pos="0">
-                    <a:srgbClr val="FFFFFF"/>
-                  </a:gs>
-                  <a:gs pos="100000">
-                    <a:srgbClr val="FFFFFF"/>
-                  </a:gs>
-                </a:gsLst>
-                <a:lin ang="5400000" scaled="0"/>
-              </a:gradFill>
-              <a:ea typeface="Segoe UI" pitchFamily="34" charset="0"/>
-              <a:cs typeface="Segoe UI" pitchFamily="34" charset="0"/>
-            </a:endParaRPr>
-          </a:p>
-        </p:txBody>
-      </p:sp>
-      <p:sp>
-        <p:nvSpPr>
-          <p:cNvPr id="6" name="Rectangle 5">
-            <a:extLst>
-              <a:ext uri="{FF2B5EF4-FFF2-40B4-BE49-F238E27FC236}">
-                <a16:creationId xmlns:a16="http://schemas.microsoft.com/office/drawing/2014/main" id="{8F54DA60-BB84-4219-970E-430D054E667F}"/>
-              </a:ext>
-            </a:extLst>
-          </p:cNvPr>
-          <p:cNvSpPr/>
-          <p:nvPr/>
-        </p:nvSpPr>
-        <p:spPr bwMode="auto">
-          <a:xfrm>
-            <a:off x="7742237" y="3192462"/>
-            <a:ext cx="2895600" cy="1143000"/>
-          </a:xfrm>
-          <a:prstGeom prst="rect">
-            <a:avLst/>
-          </a:prstGeom>
-          <a:noFill/>
-          <a:ln w="38100">
-            <a:solidFill>
-              <a:srgbClr val="FF0000"/>
-            </a:solidFill>
-            <a:headEnd type="none" w="med" len="med"/>
-            <a:tailEnd type="none" w="med" len="med"/>
-          </a:ln>
-          <a:effectLst/>
-        </p:spPr>
-        <p:style>
-          <a:lnRef idx="1">
-            <a:schemeClr val="accent2"/>
-          </a:lnRef>
-          <a:fillRef idx="3">
-            <a:schemeClr val="accent2"/>
-          </a:fillRef>
-          <a:effectRef idx="2">
-            <a:schemeClr val="accent2"/>
-          </a:effectRef>
-          <a:fontRef idx="minor">
-            <a:schemeClr val="lt1"/>
-          </a:fontRef>
-        </p:style>
-        <p:txBody>
-          <a:bodyPr rot="0" spcFirstLastPara="0" vertOverflow="overflow" horzOverflow="overflow" vert="horz" wrap="square" lIns="182880" tIns="146304" rIns="182880" bIns="146304" numCol="1" spcCol="0" rtlCol="0" fromWordArt="0" anchor="t" anchorCtr="0" forceAA="0" compatLnSpc="1">
-            <a:prstTxWarp prst="textNoShape">
-              <a:avLst/>
-            </a:prstTxWarp>
-            <a:noAutofit/>
-          </a:bodyPr>
-          <a:lstStyle/>
-          <a:p>
-            <a:pPr algn="ctr" defTabSz="932472" fontAlgn="base">
-              <a:lnSpc>
-                <a:spcPct val="90000"/>
-              </a:lnSpc>
-              <a:spcBef>
-                <a:spcPct val="0"/>
-              </a:spcBef>
-              <a:spcAft>
-                <a:spcPct val="0"/>
-              </a:spcAft>
-            </a:pPr>
-            <a:r>
-              <a:rPr lang="en-CA" sz="2400" dirty="0">
-                <a:solidFill>
-                  <a:srgbClr val="FF0000"/>
-                </a:solidFill>
-                <a:ea typeface="Segoe UI" pitchFamily="34" charset="0"/>
-                <a:cs typeface="Segoe UI" pitchFamily="34" charset="0"/>
-              </a:rPr>
-              <a:t>Wait a second that's not right!</a:t>
-            </a:r>
-          </a:p>
-        </p:txBody>
-      </p:sp>
     </p:spTree>
     <p:extLst>
       <p:ext uri="{BB962C8B-B14F-4D97-AF65-F5344CB8AC3E}">
-        <p14:creationId xmlns:p14="http://schemas.microsoft.com/office/powerpoint/2010/main" val="3109886376"/>
-      </p:ext>
-    </p:extLst>
-  </p:cSld>
-  <p:clrMapOvr>
-    <a:masterClrMapping/>
-  </p:clrMapOvr>
-  <mc:AlternateContent xmlns:mc="http://schemas.openxmlformats.org/markup-compatibility/2006" xmlns:p14="http://schemas.microsoft.com/office/powerpoint/2010/main">
-    <mc:Choice Requires="p14">
-      <p:transition p14:dur="10"/>
-    </mc:Choice>
-    <mc:Fallback xmlns="">
-      <p:transition/>
-    </mc:Fallback>
-  </mc:AlternateContent>
-  <p:timing>
-    <p:tnLst>
-      <p:par>
-        <p:cTn id="1" dur="indefinite" restart="never" nodeType="tmRoot">
-          <p:childTnLst>
-            <p:seq concurrent="1" nextAc="seek">
-              <p:cTn id="2" dur="indefinite" nodeType="mainSeq">
-                <p:childTnLst>
-                  <p:par>
-                    <p:cTn id="3" fill="hold">
-                      <p:stCondLst>
-                        <p:cond delay="indefinite"/>
-                      </p:stCondLst>
-                      <p:childTnLst>
-                        <p:par>
-                          <p:cTn id="4" fill="hold">
-                            <p:stCondLst>
-                              <p:cond delay="0"/>
-                            </p:stCondLst>
-                            <p:childTnLst>
-                              <p:par>
-                                <p:cTn id="5" presetID="1" presetClass="entr" presetSubtype="0" fill="hold" grpId="0" nodeType="clickEffect">
-                                  <p:stCondLst>
-                                    <p:cond delay="0"/>
-                                  </p:stCondLst>
-                                  <p:childTnLst>
-                                    <p:set>
-                                      <p:cBhvr>
-                                        <p:cTn id="6" dur="1" fill="hold">
-                                          <p:stCondLst>
-                                            <p:cond delay="0"/>
-                                          </p:stCondLst>
-                                        </p:cTn>
-                                        <p:tgtEl>
-                                          <p:spTgt spid="3"/>
-                                        </p:tgtEl>
-                                        <p:attrNameLst>
-                                          <p:attrName>style.visibility</p:attrName>
-                                        </p:attrNameLst>
-                                      </p:cBhvr>
-                                      <p:to>
-                                        <p:strVal val="visible"/>
-                                      </p:to>
-                                    </p:set>
-                                  </p:childTnLst>
-                                </p:cTn>
-                              </p:par>
-                              <p:par>
-                                <p:cTn id="7" presetID="1" presetClass="entr" presetSubtype="0" fill="hold" grpId="0" nodeType="withEffect">
-                                  <p:stCondLst>
-                                    <p:cond delay="0"/>
-                                  </p:stCondLst>
-                                  <p:childTnLst>
-                                    <p:set>
-                                      <p:cBhvr>
-                                        <p:cTn id="8" dur="1" fill="hold">
-                                          <p:stCondLst>
-                                            <p:cond delay="0"/>
-                                          </p:stCondLst>
-                                        </p:cTn>
-                                        <p:tgtEl>
-                                          <p:spTgt spid="6"/>
-                                        </p:tgtEl>
-                                        <p:attrNameLst>
-                                          <p:attrName>style.visibility</p:attrName>
-                                        </p:attrNameLst>
-                                      </p:cBhvr>
-                                      <p:to>
-                                        <p:strVal val="visible"/>
-                                      </p:to>
-                                    </p:set>
-                                  </p:childTnLst>
-                                </p:cTn>
-                              </p:par>
-                            </p:childTnLst>
-                          </p:cTn>
-                        </p:par>
-                      </p:childTnLst>
-                    </p:cTn>
-                  </p:par>
-                </p:childTnLst>
-              </p:cTn>
-              <p:prevCondLst>
-                <p:cond evt="onPrev" delay="0">
-                  <p:tgtEl>
-                    <p:sldTgt/>
-                  </p:tgtEl>
-                </p:cond>
-              </p:prevCondLst>
-              <p:nextCondLst>
-                <p:cond evt="onNext" delay="0">
-                  <p:tgtEl>
-                    <p:sldTgt/>
-                  </p:tgtEl>
-                </p:cond>
-              </p:nextCondLst>
-            </p:seq>
-          </p:childTnLst>
-        </p:cTn>
-      </p:par>
-    </p:tnLst>
-    <p:bldLst>
-      <p:bldP spid="3" grpId="0" animBg="1"/>
-      <p:bldP spid="6" grpId="0" animBg="1"/>
-    </p:bldLst>
-  </p:timing>
-</p:sld>
-</file>
-
-<file path=ppt/slides/slide7.xml><?xml version="1.0" encoding="utf-8"?>
-<p:sld xmlns:a="http://schemas.openxmlformats.org/drawingml/2006/main" xmlns:r="http://schemas.openxmlformats.org/officeDocument/2006/relationships" xmlns:p="http://schemas.openxmlformats.org/presentationml/2006/main">
-  <p:cSld>
-    <p:spTree>
-      <p:nvGrpSpPr>
-        <p:cNvPr id="1" name=""/>
-        <p:cNvGrpSpPr/>
-        <p:nvPr/>
-      </p:nvGrpSpPr>
-      <p:grpSpPr>
-        <a:xfrm>
-          <a:off x="0" y="0"/>
-          <a:ext cx="0" cy="0"/>
-          <a:chOff x="0" y="0"/>
-          <a:chExt cx="0" cy="0"/>
-        </a:xfrm>
-      </p:grpSpPr>
-      <p:sp>
-        <p:nvSpPr>
-          <p:cNvPr id="4" name="Title 3"/>
-          <p:cNvSpPr>
-            <a:spLocks noGrp="1"/>
-          </p:cNvSpPr>
-          <p:nvPr>
-            <p:ph type="title"/>
-          </p:nvPr>
-        </p:nvSpPr>
-        <p:spPr/>
-        <p:txBody>
-          <a:bodyPr/>
-          <a:lstStyle/>
-          <a:p>
-            <a:r>
-              <a:rPr lang="en-US" b="1" dirty="0"/>
-              <a:t>AND statements are evaluated BEFORE </a:t>
-            </a:r>
-            <a:br>
-              <a:rPr lang="en-US" b="1" dirty="0"/>
-            </a:br>
-            <a:r>
-              <a:rPr lang="en-US" b="1" dirty="0"/>
-              <a:t>OR statements so we add ( ) to change the order of operations </a:t>
-            </a:r>
-            <a:endParaRPr lang="en-US" dirty="0"/>
-          </a:p>
-        </p:txBody>
-      </p:sp>
-      <p:sp>
-        <p:nvSpPr>
-          <p:cNvPr id="5" name="Text Placeholder 4"/>
-          <p:cNvSpPr>
-            <a:spLocks noGrp="1"/>
-          </p:cNvSpPr>
-          <p:nvPr>
-            <p:ph type="body" sz="quarter" idx="10"/>
-          </p:nvPr>
-        </p:nvSpPr>
-        <p:spPr>
-          <a:xfrm>
-            <a:off x="503236" y="1371600"/>
-            <a:ext cx="11566843" cy="4712059"/>
-          </a:xfrm>
-        </p:spPr>
-        <p:txBody>
-          <a:bodyPr/>
-          <a:lstStyle/>
-          <a:p>
-            <a:endParaRPr lang="en-CA" dirty="0"/>
-          </a:p>
-          <a:p>
-            <a:endParaRPr lang="en-US" dirty="0"/>
-          </a:p>
-          <a:p>
-            <a:r>
-              <a:rPr lang="en-US" dirty="0"/>
-              <a:t>if </a:t>
-            </a:r>
-            <a:r>
-              <a:rPr lang="en-US" dirty="0">
-                <a:highlight>
-                  <a:srgbClr val="FFFF00"/>
-                </a:highlight>
-              </a:rPr>
-              <a:t>(</a:t>
-            </a:r>
-            <a:r>
-              <a:rPr lang="en-US" dirty="0"/>
-              <a:t>level == </a:t>
-            </a:r>
-            <a:r>
-              <a:rPr lang="en-US" dirty="0">
-                <a:solidFill>
-                  <a:srgbClr val="C00000"/>
-                </a:solidFill>
-              </a:rPr>
-              <a:t>'Gold' </a:t>
-            </a:r>
-            <a:r>
-              <a:rPr lang="en-US" dirty="0"/>
-              <a:t>or level == </a:t>
-            </a:r>
-            <a:r>
-              <a:rPr lang="en-US" dirty="0">
-                <a:solidFill>
-                  <a:srgbClr val="C00000"/>
-                </a:solidFill>
-              </a:rPr>
-              <a:t>'Silver'</a:t>
-            </a:r>
-            <a:r>
-              <a:rPr lang="en-US" dirty="0">
-                <a:solidFill>
-                  <a:srgbClr val="002050"/>
-                </a:solidFill>
-                <a:highlight>
-                  <a:srgbClr val="FFFF00"/>
-                </a:highlight>
-              </a:rPr>
-              <a:t>)</a:t>
-            </a:r>
-            <a:r>
-              <a:rPr lang="en-US" dirty="0">
-                <a:solidFill>
-                  <a:srgbClr val="C00000"/>
-                </a:solidFill>
-              </a:rPr>
-              <a:t> </a:t>
-            </a:r>
-            <a:r>
-              <a:rPr lang="en-US" dirty="0"/>
-              <a:t>\</a:t>
-            </a:r>
-          </a:p>
-          <a:p>
-            <a:r>
-              <a:rPr lang="en-US" dirty="0"/>
-              <a:t>                    and payment == </a:t>
-            </a:r>
-            <a:r>
-              <a:rPr lang="en-US" dirty="0">
-                <a:solidFill>
-                  <a:srgbClr val="C00000"/>
-                </a:solidFill>
-              </a:rPr>
-              <a:t>'Complete'</a:t>
-            </a:r>
-            <a:r>
-              <a:rPr lang="en-US" dirty="0">
-                <a:solidFill>
-                  <a:srgbClr val="002050"/>
-                </a:solidFill>
-              </a:rPr>
-              <a:t>:</a:t>
-            </a:r>
-          </a:p>
-          <a:p>
-            <a:r>
-              <a:rPr lang="en-US" dirty="0"/>
-              <a:t>	</a:t>
-            </a:r>
-            <a:r>
-              <a:rPr lang="en-US" dirty="0" err="1"/>
-              <a:t>free_movie</a:t>
-            </a:r>
-            <a:r>
-              <a:rPr lang="en-US" dirty="0"/>
-              <a:t> = True</a:t>
-            </a:r>
-          </a:p>
-          <a:p>
-            <a:endParaRPr lang="en-US" dirty="0"/>
-          </a:p>
-          <a:p>
-            <a:r>
-              <a:rPr lang="en-US" dirty="0">
-                <a:solidFill>
-                  <a:schemeClr val="tx2"/>
-                </a:solidFill>
-              </a:rPr>
-              <a:t>#Later in your code</a:t>
-            </a:r>
-            <a:br>
-              <a:rPr lang="en-US" dirty="0"/>
-            </a:br>
-            <a:r>
-              <a:rPr lang="en-US" dirty="0"/>
-              <a:t>if </a:t>
-            </a:r>
-            <a:r>
-              <a:rPr lang="en-US" dirty="0" err="1"/>
-              <a:t>free_movie</a:t>
-            </a:r>
-            <a:r>
-              <a:rPr lang="en-US" dirty="0"/>
-              <a:t>:</a:t>
-            </a:r>
-          </a:p>
-          <a:p>
-            <a:r>
-              <a:rPr lang="en-US" dirty="0"/>
-              <a:t>	print(</a:t>
-            </a:r>
-            <a:r>
-              <a:rPr lang="en-US" dirty="0">
-                <a:solidFill>
-                  <a:srgbClr val="C00000"/>
-                </a:solidFill>
-              </a:rPr>
-              <a:t>'enjoy'</a:t>
-            </a:r>
-            <a:r>
-              <a:rPr lang="en-US" dirty="0">
-                <a:solidFill>
-                  <a:srgbClr val="002050"/>
-                </a:solidFill>
-              </a:rPr>
-              <a:t>)</a:t>
-            </a:r>
-          </a:p>
-        </p:txBody>
-      </p:sp>
-    </p:spTree>
-    <p:extLst>
-      <p:ext uri="{BB962C8B-B14F-4D97-AF65-F5344CB8AC3E}">
-        <p14:creationId xmlns:p14="http://schemas.microsoft.com/office/powerpoint/2010/main" val="1211352738"/>
-      </p:ext>
-    </p:extLst>
-  </p:cSld>
-  <p:clrMapOvr>
-    <a:masterClrMapping/>
-  </p:clrMapOvr>
-  <mc:AlternateContent xmlns:mc="http://schemas.openxmlformats.org/markup-compatibility/2006" xmlns:p14="http://schemas.microsoft.com/office/powerpoint/2010/main">
-    <mc:Choice Requires="p14">
-      <p:transition p14:dur="10"/>
-    </mc:Choice>
-    <mc:Fallback xmlns="">
-      <p:transition/>
-    </mc:Fallback>
-  </mc:AlternateContent>
-</p:sld>
-</file>
-
-<file path=ppt/slides/slide8.xml><?xml version="1.0" encoding="utf-8"?>
-<p:sld xmlns:a="http://schemas.openxmlformats.org/drawingml/2006/main" xmlns:r="http://schemas.openxmlformats.org/officeDocument/2006/relationships" xmlns:p="http://schemas.openxmlformats.org/presentationml/2006/main">
-  <p:cSld>
-    <p:spTree>
-      <p:nvGrpSpPr>
-        <p:cNvPr id="1" name=""/>
-        <p:cNvGrpSpPr/>
-        <p:nvPr/>
-      </p:nvGrpSpPr>
-      <p:grpSpPr>
-        <a:xfrm>
-          <a:off x="0" y="0"/>
-          <a:ext cx="0" cy="0"/>
-          <a:chOff x="0" y="0"/>
-          <a:chExt cx="0" cy="0"/>
-        </a:xfrm>
-      </p:grpSpPr>
-      <p:sp>
-        <p:nvSpPr>
-          <p:cNvPr id="4" name="Title 3"/>
-          <p:cNvSpPr>
-            <a:spLocks noGrp="1"/>
-          </p:cNvSpPr>
-          <p:nvPr>
-            <p:ph type="title"/>
-          </p:nvPr>
-        </p:nvSpPr>
-        <p:spPr/>
-        <p:txBody>
-          <a:bodyPr/>
-          <a:lstStyle/>
-          <a:p>
-            <a:r>
-              <a:rPr lang="en-US" b="1" dirty="0"/>
-              <a:t>If it's an option, you could also just change the OR to an IN </a:t>
-            </a:r>
-            <a:endParaRPr lang="en-US" dirty="0"/>
-          </a:p>
-        </p:txBody>
-      </p:sp>
-      <p:sp>
-        <p:nvSpPr>
-          <p:cNvPr id="5" name="Text Placeholder 4"/>
-          <p:cNvSpPr>
-            <a:spLocks noGrp="1"/>
-          </p:cNvSpPr>
-          <p:nvPr>
-            <p:ph type="body" sz="quarter" idx="10"/>
-          </p:nvPr>
-        </p:nvSpPr>
-        <p:spPr>
-          <a:xfrm>
-            <a:off x="503236" y="1371600"/>
-            <a:ext cx="11933239" cy="3804118"/>
-          </a:xfrm>
-        </p:spPr>
-        <p:txBody>
-          <a:bodyPr/>
-          <a:lstStyle/>
-          <a:p>
-            <a:endParaRPr lang="en-CA" sz="2800" dirty="0"/>
-          </a:p>
-          <a:p>
-            <a:endParaRPr lang="en-US" sz="2800" dirty="0"/>
-          </a:p>
-          <a:p>
-            <a:r>
-              <a:rPr lang="en-US" sz="2800" dirty="0"/>
-              <a:t>if </a:t>
-            </a:r>
-            <a:r>
-              <a:rPr lang="en-US" sz="2800" dirty="0">
-                <a:highlight>
-                  <a:srgbClr val="FFFF00"/>
-                </a:highlight>
-              </a:rPr>
-              <a:t>level in(</a:t>
-            </a:r>
-            <a:r>
-              <a:rPr lang="en-US" sz="2800" dirty="0">
-                <a:solidFill>
-                  <a:srgbClr val="C00000"/>
-                </a:solidFill>
-                <a:highlight>
-                  <a:srgbClr val="FFFF00"/>
-                </a:highlight>
-              </a:rPr>
-              <a:t>'</a:t>
-            </a:r>
-            <a:r>
-              <a:rPr lang="en-US" sz="2800" dirty="0" err="1">
-                <a:solidFill>
-                  <a:srgbClr val="C00000"/>
-                </a:solidFill>
-                <a:highlight>
-                  <a:srgbClr val="FFFF00"/>
-                </a:highlight>
-              </a:rPr>
-              <a:t>Gold','Silver</a:t>
-            </a:r>
-            <a:r>
-              <a:rPr lang="en-US" sz="2800" dirty="0">
-                <a:solidFill>
-                  <a:srgbClr val="C00000"/>
-                </a:solidFill>
-                <a:highlight>
-                  <a:srgbClr val="FFFF00"/>
-                </a:highlight>
-              </a:rPr>
-              <a:t>'</a:t>
-            </a:r>
-            <a:r>
-              <a:rPr lang="en-US" sz="2800" dirty="0">
-                <a:solidFill>
-                  <a:srgbClr val="002050"/>
-                </a:solidFill>
-                <a:highlight>
-                  <a:srgbClr val="FFFF00"/>
-                </a:highlight>
-              </a:rPr>
-              <a:t>)</a:t>
-            </a:r>
-            <a:r>
-              <a:rPr lang="en-US" sz="2800" dirty="0">
-                <a:solidFill>
-                  <a:srgbClr val="C00000"/>
-                </a:solidFill>
-                <a:highlight>
-                  <a:srgbClr val="FFFF00"/>
-                </a:highlight>
-              </a:rPr>
-              <a:t> </a:t>
-            </a:r>
-            <a:r>
-              <a:rPr lang="en-US" sz="2800" dirty="0"/>
-              <a:t>and payment == </a:t>
-            </a:r>
-            <a:r>
-              <a:rPr lang="en-US" sz="2800" dirty="0">
-                <a:solidFill>
-                  <a:srgbClr val="C00000"/>
-                </a:solidFill>
-              </a:rPr>
-              <a:t>'Complete'</a:t>
-            </a:r>
-            <a:r>
-              <a:rPr lang="en-US" sz="2800" dirty="0">
-                <a:solidFill>
-                  <a:srgbClr val="002050"/>
-                </a:solidFill>
-              </a:rPr>
-              <a:t>:</a:t>
-            </a:r>
-          </a:p>
-          <a:p>
-            <a:r>
-              <a:rPr lang="en-US" sz="2800" dirty="0"/>
-              <a:t>	</a:t>
-            </a:r>
-            <a:r>
-              <a:rPr lang="en-US" sz="2800" dirty="0" err="1"/>
-              <a:t>free_movie</a:t>
-            </a:r>
-            <a:r>
-              <a:rPr lang="en-US" sz="2800" dirty="0"/>
-              <a:t> = True</a:t>
-            </a:r>
-          </a:p>
-          <a:p>
-            <a:endParaRPr lang="en-US" sz="2800" dirty="0"/>
-          </a:p>
-          <a:p>
-            <a:r>
-              <a:rPr lang="en-US" sz="2800" dirty="0">
-                <a:solidFill>
-                  <a:schemeClr val="tx2"/>
-                </a:solidFill>
-              </a:rPr>
-              <a:t>#Later in your code</a:t>
-            </a:r>
-            <a:br>
-              <a:rPr lang="en-US" sz="2800" dirty="0"/>
-            </a:br>
-            <a:r>
-              <a:rPr lang="en-US" sz="2800" dirty="0"/>
-              <a:t>if </a:t>
-            </a:r>
-            <a:r>
-              <a:rPr lang="en-US" sz="2800" dirty="0" err="1"/>
-              <a:t>free_movie</a:t>
-            </a:r>
-            <a:r>
-              <a:rPr lang="en-US" sz="2800" dirty="0"/>
-              <a:t>:</a:t>
-            </a:r>
-          </a:p>
-          <a:p>
-            <a:r>
-              <a:rPr lang="en-US" sz="2800" dirty="0"/>
-              <a:t>	print(</a:t>
-            </a:r>
-            <a:r>
-              <a:rPr lang="en-US" sz="2800" dirty="0">
-                <a:solidFill>
-                  <a:srgbClr val="C00000"/>
-                </a:solidFill>
-              </a:rPr>
-              <a:t>'enjoy'</a:t>
-            </a:r>
-            <a:r>
-              <a:rPr lang="en-US" sz="2800" dirty="0">
-                <a:solidFill>
-                  <a:srgbClr val="002050"/>
-                </a:solidFill>
-              </a:rPr>
-              <a:t>)</a:t>
-            </a:r>
-          </a:p>
-        </p:txBody>
-      </p:sp>
-    </p:spTree>
-    <p:extLst>
-      <p:ext uri="{BB962C8B-B14F-4D97-AF65-F5344CB8AC3E}">
-        <p14:creationId xmlns:p14="http://schemas.microsoft.com/office/powerpoint/2010/main" val="888923083"/>
-      </p:ext>
-    </p:extLst>
-  </p:cSld>
-  <p:clrMapOvr>
-    <a:masterClrMapping/>
-  </p:clrMapOvr>
-  <mc:AlternateContent xmlns:mc="http://schemas.openxmlformats.org/markup-compatibility/2006" xmlns:p14="http://schemas.microsoft.com/office/powerpoint/2010/main">
-    <mc:Choice Requires="p14">
-      <p:transition p14:dur="10"/>
-    </mc:Choice>
-    <mc:Fallback xmlns="">
-      <p:transition/>
-    </mc:Fallback>
-  </mc:AlternateContent>
-</p:sld>
-</file>
-
-<file path=ppt/slides/slide9.xml><?xml version="1.0" encoding="utf-8"?>
-<p:sld xmlns:a="http://schemas.openxmlformats.org/drawingml/2006/main" xmlns:r="http://schemas.openxmlformats.org/officeDocument/2006/relationships" xmlns:p="http://schemas.openxmlformats.org/presentationml/2006/main">
-  <p:cSld>
-    <p:spTree>
-      <p:nvGrpSpPr>
-        <p:cNvPr id="1" name=""/>
-        <p:cNvGrpSpPr/>
-        <p:nvPr/>
-      </p:nvGrpSpPr>
-      <p:grpSpPr>
-        <a:xfrm>
-          <a:off x="0" y="0"/>
-          <a:ext cx="0" cy="0"/>
-          <a:chOff x="0" y="0"/>
-          <a:chExt cx="0" cy="0"/>
-        </a:xfrm>
-      </p:grpSpPr>
-      <p:sp>
-        <p:nvSpPr>
-          <p:cNvPr id="4" name="Title 3"/>
-          <p:cNvSpPr>
-            <a:spLocks noGrp="1"/>
-          </p:cNvSpPr>
-          <p:nvPr>
-            <p:ph type="title"/>
-          </p:nvPr>
-        </p:nvSpPr>
-        <p:spPr/>
-        <p:txBody>
-          <a:bodyPr/>
-          <a:lstStyle/>
-          <a:p>
-            <a:r>
-              <a:rPr lang="en-US" b="1" dirty="0"/>
-              <a:t>Combining operators allows you to handle complex business rules in your code but must be tested very carefully to avoid introducing errors</a:t>
-            </a:r>
-            <a:endParaRPr lang="en-US" dirty="0"/>
-          </a:p>
-        </p:txBody>
-      </p:sp>
-    </p:spTree>
-    <p:extLst>
-      <p:ext uri="{BB962C8B-B14F-4D97-AF65-F5344CB8AC3E}">
-        <p14:creationId xmlns:p14="http://schemas.microsoft.com/office/powerpoint/2010/main" val="4000133069"/>
+        <p14:creationId xmlns:p14="http://schemas.microsoft.com/office/powerpoint/2010/main" val="2137390358"/>
       </p:ext>
     </p:extLst>
   </p:cSld>
@@ -45084,36 +42630,6 @@
 </file>
 
 <file path=customXml/item1.xml><?xml version="1.0" encoding="utf-8"?>
-<Control xmlns="http://schemas.microsoft.com/VisualStudio/2011/storyboarding/control">
-  <Id Name="d69996e1-3d61-4686-9b63-f1b855c596ab" Revision="1" Stencil="7276b9ef-3953-4dce-a89b-ed85f20b8b93" StencilVersion="1.0"/>
-</Control>
-</file>
-
-<file path=customXml/item10.xml><?xml version="1.0" encoding="utf-8"?>
-<?mso-contentType ?>
-<FormTemplates xmlns="http://schemas.microsoft.com/sharepoint/v3/contenttype/forms">
-  <Display>DocumentLibraryForm</Display>
-  <Edit>DocumentLibraryForm</Edit>
-  <New>DocumentLibraryForm</New>
-</FormTemplates>
-</file>
-
-<file path=customXml/item11.xml><?xml version="1.0" encoding="utf-8"?>
-<Control xmlns="http://schemas.microsoft.com/VisualStudio/2011/storyboarding/control">
-  <Id Name="a53d73d2-368b-429e-b817-1324eec1382c" Revision="1" Stencil="7276b9ef-3953-4dce-a89b-ed85f20b8b93" StencilVersion="1.0"/>
-</Control>
-</file>
-
-<file path=customXml/item12.xml><?xml version="1.0" encoding="utf-8"?>
-<?mso-contentType ?>
-<FormTemplates xmlns="http://schemas.microsoft.com/sharepoint/v3/contenttype/forms">
-  <Display>DocumentLibraryForm</Display>
-  <Edit>DocumentLibraryForm</Edit>
-  <New>DocumentLibraryForm</New>
-</FormTemplates>
-</file>
-
-<file path=customXml/item13.xml><?xml version="1.0" encoding="utf-8"?>
 <p:properties xmlns:p="http://schemas.microsoft.com/office/2006/metadata/properties" xmlns:xsi="http://www.w3.org/2001/XMLSchema-instance" xmlns:pc="http://schemas.microsoft.com/office/infopath/2007/PartnerControls">
   <documentManagement>
     <SharedWithUsers xmlns="83cd2334-221a-48c3-9034-bfd1542dfe28">
@@ -45137,33 +42653,96 @@
 </p:properties>
 </file>
 
-<file path=customXml/item14.xml><?xml version="1.0" encoding="utf-8"?>
+<file path=customXml/item10.xml><?xml version="1.0" encoding="utf-8"?>
+<Control xmlns="http://schemas.microsoft.com/VisualStudio/2011/storyboarding/control">
+  <Id Name="369f9055-6b6c-48b9-9320-5df2d46c430a" Revision="1" Stencil="7276b9ef-3953-4dce-a89b-ed85f20b8b93" StencilVersion="1.0"/>
+</Control>
+</file>
+
+<file path=customXml/item11.xml><?xml version="1.0" encoding="utf-8"?>
+<p:properties xmlns:p="http://schemas.microsoft.com/office/2006/metadata/properties" xmlns:xsi="http://www.w3.org/2001/XMLSchema-instance" xmlns:pc="http://schemas.microsoft.com/office/infopath/2007/PartnerControls">
+  <documentManagement>
+    <SharedWithUsers xmlns="83cd2334-221a-48c3-9034-bfd1542dfe28">
+      <UserInfo>
+        <DisplayName>Gilad Turbahn</DisplayName>
+        <AccountId>511</AccountId>
+        <AccountType/>
+      </UserInfo>
+      <UserInfo>
+        <DisplayName>Keith Boyd</DisplayName>
+        <AccountId>993</AccountId>
+        <AccountType/>
+      </UserInfo>
+      <UserInfo>
+        <DisplayName>Christopher Harrison</DisplayName>
+        <AccountId>1176</AccountId>
+        <AccountType/>
+      </UserInfo>
+    </SharedWithUsers>
+  </documentManagement>
+</p:properties>
+</file>
+
+<file path=customXml/item12.xml><?xml version="1.0" encoding="utf-8"?>
+<p:properties xmlns:p="http://schemas.microsoft.com/office/2006/metadata/properties" xmlns:xsi="http://www.w3.org/2001/XMLSchema-instance" xmlns:pc="http://schemas.microsoft.com/office/infopath/2007/PartnerControls">
+  <documentManagement>
+    <SharedWithUsers xmlns="83cd2334-221a-48c3-9034-bfd1542dfe28">
+      <UserInfo>
+        <DisplayName>Gilad Turbahn</DisplayName>
+        <AccountId>511</AccountId>
+        <AccountType/>
+      </UserInfo>
+      <UserInfo>
+        <DisplayName>Keith Boyd</DisplayName>
+        <AccountId>993</AccountId>
+        <AccountType/>
+      </UserInfo>
+      <UserInfo>
+        <DisplayName>Christopher Harrison</DisplayName>
+        <AccountId>1176</AccountId>
+        <AccountType/>
+      </UserInfo>
+    </SharedWithUsers>
+  </documentManagement>
+</p:properties>
+</file>
+
+<file path=customXml/item13.xml><?xml version="1.0" encoding="utf-8"?>
 <Control xmlns="http://schemas.microsoft.com/VisualStudio/2011/storyboarding/control">
   <Id Name="d69996e1-3d61-4686-9b63-f1b855c596ab" Revision="1" Stencil="7276b9ef-3953-4dce-a89b-ed85f20b8b93" StencilVersion="1.0"/>
 </Control>
 </file>
 
-<file path=customXml/item15.xml><?xml version="1.0" encoding="utf-8"?>
+<file path=customXml/item14.xml><?xml version="1.0" encoding="utf-8"?>
 <Control xmlns="http://schemas.microsoft.com/VisualStudio/2011/storyboarding/control">
   <Id Name="369f9055-6b6c-48b9-9320-5df2d46c430a" Revision="1" Stencil="7276b9ef-3953-4dce-a89b-ed85f20b8b93" StencilVersion="1.0"/>
 </Control>
 </file>
 
+<file path=customXml/item15.xml><?xml version="1.0" encoding="utf-8"?>
+<?mso-contentType ?>
+<FormTemplates xmlns="http://schemas.microsoft.com/sharepoint/v3/contenttype/forms">
+  <Display>DocumentLibraryForm</Display>
+  <Edit>DocumentLibraryForm</Edit>
+  <New>DocumentLibraryForm</New>
+</FormTemplates>
+</file>
+
 <file path=customXml/item16.xml><?xml version="1.0" encoding="utf-8"?>
+<Control xmlns="http://schemas.microsoft.com/VisualStudio/2011/storyboarding/control">
+  <Id Name="369f9055-6b6c-48b9-9320-5df2d46c430a" Revision="1" Stencil="7276b9ef-3953-4dce-a89b-ed85f20b8b93" StencilVersion="1.0"/>
+</Control>
+</file>
+
+<file path=customXml/item17.xml><?xml version="1.0" encoding="utf-8"?>
 <Control xmlns="http://schemas.microsoft.com/VisualStudio/2011/storyboarding/control">
   <Id Name="fb22c541-ded0-47fa-8877-83a4c2d16227" Revision="1" Stencil="7276b9ef-3953-4dce-a89b-ed85f20b8b93" StencilVersion="1.0"/>
 </Control>
 </file>
 
-<file path=customXml/item17.xml><?xml version="1.0" encoding="utf-8"?>
-<Control xmlns="http://schemas.microsoft.com/VisualStudio/2011/storyboarding/control">
-  <Id Name="a2191c86-fc50-4add-948c-129f6b5a88d8" Revision="1" Stencil="7276b9ef-3953-4dce-a89b-ed85f20b8b93" StencilVersion="1.0"/>
-</Control>
-</file>
-
 <file path=customXml/item18.xml><?xml version="1.0" encoding="utf-8"?>
 <Control xmlns="http://schemas.microsoft.com/VisualStudio/2011/storyboarding/control">
-  <Id Name="a53d73d2-368b-429e-b817-1324eec1382c" Revision="1" Stencil="7276b9ef-3953-4dce-a89b-ed85f20b8b93" StencilVersion="1.0"/>
+  <Id Name="d69996e1-3d61-4686-9b63-f1b855c596ab" Revision="1" Stencil="7276b9ef-3953-4dce-a89b-ed85f20b8b93" StencilVersion="1.0"/>
 </Control>
 </file>
 
@@ -45183,30 +42762,6 @@
 </file>
 
 <file path=customXml/item20.xml><?xml version="1.0" encoding="utf-8"?>
-<Control xmlns="http://schemas.microsoft.com/VisualStudio/2011/storyboarding/control">
-  <Id Name="fb22c541-ded0-47fa-8877-83a4c2d16227" Revision="1" Stencil="7276b9ef-3953-4dce-a89b-ed85f20b8b93" StencilVersion="1.0"/>
-</Control>
-</file>
-
-<file path=customXml/item21.xml><?xml version="1.0" encoding="utf-8"?>
-<Control xmlns="http://schemas.microsoft.com/VisualStudio/2011/storyboarding/control">
-  <Id Name="a53d73d2-368b-429e-b817-1324eec1382c" Revision="1" Stencil="7276b9ef-3953-4dce-a89b-ed85f20b8b93" StencilVersion="1.0"/>
-</Control>
-</file>
-
-<file path=customXml/item22.xml><?xml version="1.0" encoding="utf-8"?>
-<Control xmlns="http://schemas.microsoft.com/VisualStudio/2011/storyboarding/control">
-  <Id Name="fb22c541-ded0-47fa-8877-83a4c2d16227" Revision="1" Stencil="7276b9ef-3953-4dce-a89b-ed85f20b8b93" StencilVersion="1.0"/>
-</Control>
-</file>
-
-<file path=customXml/item23.xml><?xml version="1.0" encoding="utf-8"?>
-<Control xmlns="http://schemas.microsoft.com/VisualStudio/2011/storyboarding/control">
-  <Id Name="fb22c541-ded0-47fa-8877-83a4c2d16227" Revision="1" Stencil="7276b9ef-3953-4dce-a89b-ed85f20b8b93" StencilVersion="1.0"/>
-</Control>
-</file>
-
-<file path=customXml/item24.xml><?xml version="1.0" encoding="utf-8"?>
 <?mso-contentType ?>
 <FormTemplates xmlns="http://schemas.microsoft.com/sharepoint/v3/contenttype/forms">
   <Display>DocumentLibraryForm</Display>
@@ -45215,21 +42770,66 @@
 </FormTemplates>
 </file>
 
+<file path=customXml/item21.xml><?xml version="1.0" encoding="utf-8"?>
+<?mso-contentType ?>
+<FormTemplates xmlns="http://schemas.microsoft.com/sharepoint/v3/contenttype/forms">
+  <Display>DocumentLibraryForm</Display>
+  <Edit>DocumentLibraryForm</Edit>
+  <New>DocumentLibraryForm</New>
+</FormTemplates>
+</file>
+
+<file path=customXml/item22.xml><?xml version="1.0" encoding="utf-8"?>
+<Control xmlns="http://schemas.microsoft.com/VisualStudio/2011/storyboarding/control">
+  <Id Name="a53d73d2-368b-429e-b817-1324eec1382c" Revision="1" Stencil="7276b9ef-3953-4dce-a89b-ed85f20b8b93" StencilVersion="1.0"/>
+</Control>
+</file>
+
+<file path=customXml/item23.xml><?xml version="1.0" encoding="utf-8"?>
+<p:properties xmlns:p="http://schemas.microsoft.com/office/2006/metadata/properties" xmlns:xsi="http://www.w3.org/2001/XMLSchema-instance" xmlns:pc="http://schemas.microsoft.com/office/infopath/2007/PartnerControls">
+  <documentManagement>
+    <SharedWithUsers xmlns="83cd2334-221a-48c3-9034-bfd1542dfe28">
+      <UserInfo>
+        <DisplayName>Gilad Turbahn</DisplayName>
+        <AccountId>511</AccountId>
+        <AccountType/>
+      </UserInfo>
+      <UserInfo>
+        <DisplayName>Keith Boyd</DisplayName>
+        <AccountId>993</AccountId>
+        <AccountType/>
+      </UserInfo>
+      <UserInfo>
+        <DisplayName>Christopher Harrison</DisplayName>
+        <AccountId>1176</AccountId>
+        <AccountType/>
+      </UserInfo>
+    </SharedWithUsers>
+  </documentManagement>
+</p:properties>
+</file>
+
+<file path=customXml/item24.xml><?xml version="1.0" encoding="utf-8"?>
+<Control xmlns="http://schemas.microsoft.com/VisualStudio/2011/storyboarding/control">
+  <Id Name="d69996e1-3d61-4686-9b63-f1b855c596ab" Revision="1" Stencil="7276b9ef-3953-4dce-a89b-ed85f20b8b93" StencilVersion="1.0"/>
+</Control>
+</file>
+
 <file path=customXml/item25.xml><?xml version="1.0" encoding="utf-8"?>
+<Control xmlns="http://schemas.microsoft.com/VisualStudio/2011/storyboarding/control">
+  <Id Name="fb22c541-ded0-47fa-8877-83a4c2d16227" Revision="1" Stencil="7276b9ef-3953-4dce-a89b-ed85f20b8b93" StencilVersion="1.0"/>
+</Control>
+</file>
+
+<file path=customXml/item26.xml><?xml version="1.0" encoding="utf-8"?>
 <Control xmlns="http://schemas.microsoft.com/VisualStudio/2011/storyboarding/control">
   <Id Name="a2191c86-fc50-4add-948c-129f6b5a88d8" Revision="1" Stencil="7276b9ef-3953-4dce-a89b-ed85f20b8b93" StencilVersion="1.0"/>
 </Control>
 </file>
 
-<file path=customXml/item26.xml><?xml version="1.0" encoding="utf-8"?>
-<Control xmlns="http://schemas.microsoft.com/VisualStudio/2011/storyboarding/control">
-  <Id Name="369f9055-6b6c-48b9-9320-5df2d46c430a" Revision="1" Stencil="7276b9ef-3953-4dce-a89b-ed85f20b8b93" StencilVersion="1.0"/>
-</Control>
-</file>
-
 <file path=customXml/item27.xml><?xml version="1.0" encoding="utf-8"?>
 <Control xmlns="http://schemas.microsoft.com/VisualStudio/2011/storyboarding/control">
-  <Id Name="a2191c86-fc50-4add-948c-129f6b5a88d8" Revision="1" Stencil="7276b9ef-3953-4dce-a89b-ed85f20b8b93" StencilVersion="1.0"/>
+  <Id Name="a53d73d2-368b-429e-b817-1324eec1382c" Revision="1" Stencil="7276b9ef-3953-4dce-a89b-ed85f20b8b93" StencilVersion="1.0"/>
 </Control>
 </file>
 
@@ -45240,15 +42840,54 @@
 </file>
 
 <file path=customXml/item29.xml><?xml version="1.0" encoding="utf-8"?>
-<?mso-contentType ?>
-<FormTemplates xmlns="http://schemas.microsoft.com/sharepoint/v3/contenttype/forms">
-  <Display>DocumentLibraryForm</Display>
-  <Edit>DocumentLibraryForm</Edit>
-  <New>DocumentLibraryForm</New>
-</FormTemplates>
+<Control xmlns="http://schemas.microsoft.com/VisualStudio/2011/storyboarding/control">
+  <Id Name="d69996e1-3d61-4686-9b63-f1b855c596ab" Revision="1" Stencil="7276b9ef-3953-4dce-a89b-ed85f20b8b93" StencilVersion="1.0"/>
+</Control>
 </file>
 
 <file path=customXml/item3.xml><?xml version="1.0" encoding="utf-8"?>
+<Control xmlns="http://schemas.microsoft.com/VisualStudio/2011/storyboarding/control">
+  <Id Name="fb22c541-ded0-47fa-8877-83a4c2d16227" Revision="1" Stencil="7276b9ef-3953-4dce-a89b-ed85f20b8b93" StencilVersion="1.0"/>
+</Control>
+</file>
+
+<file path=customXml/item30.xml><?xml version="1.0" encoding="utf-8"?>
+<Control xmlns="http://schemas.microsoft.com/VisualStudio/2011/storyboarding/control">
+  <Id Name="d69996e1-3d61-4686-9b63-f1b855c596ab" Revision="1" Stencil="7276b9ef-3953-4dce-a89b-ed85f20b8b93" StencilVersion="1.0"/>
+</Control>
+</file>
+
+<file path=customXml/item31.xml><?xml version="1.0" encoding="utf-8"?>
+<p:properties xmlns:p="http://schemas.microsoft.com/office/2006/metadata/properties" xmlns:xsi="http://www.w3.org/2001/XMLSchema-instance" xmlns:pc="http://schemas.microsoft.com/office/infopath/2007/PartnerControls">
+  <documentManagement>
+    <SharedWithUsers xmlns="83cd2334-221a-48c3-9034-bfd1542dfe28">
+      <UserInfo>
+        <DisplayName>Gilad Turbahn</DisplayName>
+        <AccountId>511</AccountId>
+        <AccountType/>
+      </UserInfo>
+      <UserInfo>
+        <DisplayName>Keith Boyd</DisplayName>
+        <AccountId>993</AccountId>
+        <AccountType/>
+      </UserInfo>
+      <UserInfo>
+        <DisplayName>Christopher Harrison</DisplayName>
+        <AccountId>1176</AccountId>
+        <AccountType/>
+      </UserInfo>
+    </SharedWithUsers>
+  </documentManagement>
+</p:properties>
+</file>
+
+<file path=customXml/item32.xml><?xml version="1.0" encoding="utf-8"?>
+<Control xmlns="http://schemas.microsoft.com/VisualStudio/2011/storyboarding/control">
+  <Id Name="a2191c86-fc50-4add-948c-129f6b5a88d8" Revision="1" Stencil="7276b9ef-3953-4dce-a89b-ed85f20b8b93" StencilVersion="1.0"/>
+</Control>
+</file>
+
+<file path=customXml/item33.xml><?xml version="1.0" encoding="utf-8"?>
 <ct:contentTypeSchema xmlns:ct="http://schemas.microsoft.com/office/2006/metadata/contentType" xmlns:ma="http://schemas.microsoft.com/office/2006/metadata/properties/metaAttributes" ct:_="" ma:_="" ma:contentTypeName="Document" ma:contentTypeID="0x010100674EDBEC711BD14FBA6FF5C10FEFEAC7" ma:contentTypeVersion="2" ma:contentTypeDescription="Create a new document." ma:contentTypeScope="" ma:versionID="2439c5e21841780d4f192983b535a097">
   <xsd:schema xmlns:xsd="http://www.w3.org/2001/XMLSchema" xmlns:xs="http://www.w3.org/2001/XMLSchema" xmlns:p="http://schemas.microsoft.com/office/2006/metadata/properties" xmlns:ns2="83cd2334-221a-48c3-9034-bfd1542dfe28" targetNamespace="http://schemas.microsoft.com/office/2006/metadata/properties" ma:root="true" ma:fieldsID="2bca9163d8d0b233c3086236a9289b04" ns2:_="">
     <xsd:import namespace="83cd2334-221a-48c3-9034-bfd1542dfe28"/>
@@ -45396,67 +43035,25 @@
 </ct:contentTypeSchema>
 </file>
 
-<file path=customXml/item30.xml><?xml version="1.0" encoding="utf-8"?>
-<Control xmlns="http://schemas.microsoft.com/VisualStudio/2011/storyboarding/control">
-  <Id Name="a53d73d2-368b-429e-b817-1324eec1382c" Revision="1" Stencil="7276b9ef-3953-4dce-a89b-ed85f20b8b93" StencilVersion="1.0"/>
-</Control>
-</file>
-
-<file path=customXml/item31.xml><?xml version="1.0" encoding="utf-8"?>
-<Control xmlns="http://schemas.microsoft.com/VisualStudio/2011/storyboarding/control">
-  <Id Name="a53d73d2-368b-429e-b817-1324eec1382c" Revision="1" Stencil="7276b9ef-3953-4dce-a89b-ed85f20b8b93" StencilVersion="1.0"/>
-</Control>
-</file>
-
-<file path=customXml/item32.xml><?xml version="1.0" encoding="utf-8"?>
-<p:properties xmlns:p="http://schemas.microsoft.com/office/2006/metadata/properties" xmlns:xsi="http://www.w3.org/2001/XMLSchema-instance" xmlns:pc="http://schemas.microsoft.com/office/infopath/2007/PartnerControls">
-  <documentManagement>
-    <SharedWithUsers xmlns="83cd2334-221a-48c3-9034-bfd1542dfe28">
-      <UserInfo>
-        <DisplayName>Gilad Turbahn</DisplayName>
-        <AccountId>511</AccountId>
-        <AccountType/>
-      </UserInfo>
-      <UserInfo>
-        <DisplayName>Keith Boyd</DisplayName>
-        <AccountId>993</AccountId>
-        <AccountType/>
-      </UserInfo>
-      <UserInfo>
-        <DisplayName>Christopher Harrison</DisplayName>
-        <AccountId>1176</AccountId>
-        <AccountType/>
-      </UserInfo>
-    </SharedWithUsers>
-  </documentManagement>
-</p:properties>
-</file>
-
-<file path=customXml/item33.xml><?xml version="1.0" encoding="utf-8"?>
-<Control xmlns="http://schemas.microsoft.com/VisualStudio/2011/storyboarding/control">
-  <Id Name="369f9055-6b6c-48b9-9320-5df2d46c430a" Revision="1" Stencil="7276b9ef-3953-4dce-a89b-ed85f20b8b93" StencilVersion="1.0"/>
-</Control>
-</file>
-
 <file path=customXml/item34.xml><?xml version="1.0" encoding="utf-8"?>
-<Control xmlns="http://schemas.microsoft.com/VisualStudio/2011/storyboarding/control">
-  <Id Name="a2191c86-fc50-4add-948c-129f6b5a88d8" Revision="1" Stencil="7276b9ef-3953-4dce-a89b-ed85f20b8b93" StencilVersion="1.0"/>
-</Control>
-</file>
-
-<file path=customXml/item35.xml><?xml version="1.0" encoding="utf-8"?>
-<Control xmlns="http://schemas.microsoft.com/VisualStudio/2011/storyboarding/control">
-  <Id Name="d69996e1-3d61-4686-9b63-f1b855c596ab" Revision="1" Stencil="7276b9ef-3953-4dce-a89b-ed85f20b8b93" StencilVersion="1.0"/>
-</Control>
-</file>
-
-<file path=customXml/item36.xml><?xml version="1.0" encoding="utf-8"?>
 <?mso-contentType ?>
 <FormTemplates xmlns="http://schemas.microsoft.com/sharepoint/v3/contenttype/forms">
   <Display>DocumentLibraryForm</Display>
   <Edit>DocumentLibraryForm</Edit>
   <New>DocumentLibraryForm</New>
 </FormTemplates>
+</file>
+
+<file path=customXml/item35.xml><?xml version="1.0" encoding="utf-8"?>
+<Control xmlns="http://schemas.microsoft.com/VisualStudio/2011/storyboarding/control">
+  <Id Name="a2191c86-fc50-4add-948c-129f6b5a88d8" Revision="1" Stencil="7276b9ef-3953-4dce-a89b-ed85f20b8b93" StencilVersion="1.0"/>
+</Control>
+</file>
+
+<file path=customXml/item36.xml><?xml version="1.0" encoding="utf-8"?>
+<Control xmlns="http://schemas.microsoft.com/VisualStudio/2011/storyboarding/control">
+  <Id Name="a2191c86-fc50-4add-948c-129f6b5a88d8" Revision="1" Stencil="7276b9ef-3953-4dce-a89b-ed85f20b8b93" StencilVersion="1.0"/>
+</Control>
 </file>
 
 <file path=customXml/item37.xml><?xml version="1.0" encoding="utf-8"?>
@@ -45473,14 +43070,17 @@
 
 <file path=customXml/item39.xml><?xml version="1.0" encoding="utf-8"?>
 <Control xmlns="http://schemas.microsoft.com/VisualStudio/2011/storyboarding/control">
-  <Id Name="a2191c86-fc50-4add-948c-129f6b5a88d8" Revision="1" Stencil="7276b9ef-3953-4dce-a89b-ed85f20b8b93" StencilVersion="1.0"/>
+  <Id Name="369f9055-6b6c-48b9-9320-5df2d46c430a" Revision="1" Stencil="7276b9ef-3953-4dce-a89b-ed85f20b8b93" StencilVersion="1.0"/>
 </Control>
 </file>
 
 <file path=customXml/item4.xml><?xml version="1.0" encoding="utf-8"?>
-<Control xmlns="http://schemas.microsoft.com/VisualStudio/2011/storyboarding/control">
-  <Id Name="d69996e1-3d61-4686-9b63-f1b855c596ab" Revision="1" Stencil="7276b9ef-3953-4dce-a89b-ed85f20b8b93" StencilVersion="1.0"/>
-</Control>
+<?mso-contentType ?>
+<FormTemplates xmlns="http://schemas.microsoft.com/sharepoint/v3/contenttype/forms">
+  <Display>DocumentLibraryForm</Display>
+  <Edit>DocumentLibraryForm</Edit>
+  <New>DocumentLibraryForm</New>
+</FormTemplates>
 </file>
 
 <file path=customXml/item40.xml><?xml version="1.0" encoding="utf-8"?>
@@ -45509,113 +43109,59 @@
 
 <file path=customXml/item41.xml><?xml version="1.0" encoding="utf-8"?>
 <Control xmlns="http://schemas.microsoft.com/VisualStudio/2011/storyboarding/control">
-  <Id Name="fb22c541-ded0-47fa-8877-83a4c2d16227" Revision="1" Stencil="7276b9ef-3953-4dce-a89b-ed85f20b8b93" StencilVersion="1.0"/>
+  <Id Name="a53d73d2-368b-429e-b817-1324eec1382c" Revision="1" Stencil="7276b9ef-3953-4dce-a89b-ed85f20b8b93" StencilVersion="1.0"/>
 </Control>
 </file>
 
 <file path=customXml/item42.xml><?xml version="1.0" encoding="utf-8"?>
 <Control xmlns="http://schemas.microsoft.com/VisualStudio/2011/storyboarding/control">
-  <Id Name="a53d73d2-368b-429e-b817-1324eec1382c" Revision="1" Stencil="7276b9ef-3953-4dce-a89b-ed85f20b8b93" StencilVersion="1.0"/>
+  <Id Name="a2191c86-fc50-4add-948c-129f6b5a88d8" Revision="1" Stencil="7276b9ef-3953-4dce-a89b-ed85f20b8b93" StencilVersion="1.0"/>
 </Control>
 </file>
 
 <file path=customXml/item43.xml><?xml version="1.0" encoding="utf-8"?>
 <Control xmlns="http://schemas.microsoft.com/VisualStudio/2011/storyboarding/control">
-  <Id Name="d69996e1-3d61-4686-9b63-f1b855c596ab" Revision="1" Stencil="7276b9ef-3953-4dce-a89b-ed85f20b8b93" StencilVersion="1.0"/>
+  <Id Name="a53d73d2-368b-429e-b817-1324eec1382c" Revision="1" Stencil="7276b9ef-3953-4dce-a89b-ed85f20b8b93" StencilVersion="1.0"/>
 </Control>
 </file>
 
 <file path=customXml/item44.xml><?xml version="1.0" encoding="utf-8"?>
-<p:properties xmlns:p="http://schemas.microsoft.com/office/2006/metadata/properties" xmlns:xsi="http://www.w3.org/2001/XMLSchema-instance" xmlns:pc="http://schemas.microsoft.com/office/infopath/2007/PartnerControls">
-  <documentManagement>
-    <SharedWithUsers xmlns="83cd2334-221a-48c3-9034-bfd1542dfe28">
-      <UserInfo>
-        <DisplayName>Gilad Turbahn</DisplayName>
-        <AccountId>511</AccountId>
-        <AccountType/>
-      </UserInfo>
-      <UserInfo>
-        <DisplayName>Keith Boyd</DisplayName>
-        <AccountId>993</AccountId>
-        <AccountType/>
-      </UserInfo>
-      <UserInfo>
-        <DisplayName>Christopher Harrison</DisplayName>
-        <AccountId>1176</AccountId>
-        <AccountType/>
-      </UserInfo>
-    </SharedWithUsers>
-  </documentManagement>
-</p:properties>
+<Control xmlns="http://schemas.microsoft.com/VisualStudio/2011/storyboarding/control">
+  <Id Name="a2191c86-fc50-4add-948c-129f6b5a88d8" Revision="1" Stencil="7276b9ef-3953-4dce-a89b-ed85f20b8b93" StencilVersion="1.0"/>
+</Control>
 </file>
 
 <file path=customXml/item45.xml><?xml version="1.0" encoding="utf-8"?>
-<p:properties xmlns:p="http://schemas.microsoft.com/office/2006/metadata/properties" xmlns:xsi="http://www.w3.org/2001/XMLSchema-instance" xmlns:pc="http://schemas.microsoft.com/office/infopath/2007/PartnerControls">
-  <documentManagement>
-    <SharedWithUsers xmlns="83cd2334-221a-48c3-9034-bfd1542dfe28">
-      <UserInfo>
-        <DisplayName>Gilad Turbahn</DisplayName>
-        <AccountId>511</AccountId>
-        <AccountType/>
-      </UserInfo>
-      <UserInfo>
-        <DisplayName>Keith Boyd</DisplayName>
-        <AccountId>993</AccountId>
-        <AccountType/>
-      </UserInfo>
-      <UserInfo>
-        <DisplayName>Christopher Harrison</DisplayName>
-        <AccountId>1176</AccountId>
-        <AccountType/>
-      </UserInfo>
-    </SharedWithUsers>
-  </documentManagement>
-</p:properties>
+<Control xmlns="http://schemas.microsoft.com/VisualStudio/2011/storyboarding/control">
+  <Id Name="a53d73d2-368b-429e-b817-1324eec1382c" Revision="1" Stencil="7276b9ef-3953-4dce-a89b-ed85f20b8b93" StencilVersion="1.0"/>
+</Control>
 </file>
 
 <file path=customXml/item5.xml><?xml version="1.0" encoding="utf-8"?>
+<Control xmlns="http://schemas.microsoft.com/VisualStudio/2011/storyboarding/control">
+  <Id Name="fb22c541-ded0-47fa-8877-83a4c2d16227" Revision="1" Stencil="7276b9ef-3953-4dce-a89b-ed85f20b8b93" StencilVersion="1.0"/>
+</Control>
+</file>
+
+<file path=customXml/item6.xml><?xml version="1.0" encoding="utf-8"?>
+<Control xmlns="http://schemas.microsoft.com/VisualStudio/2011/storyboarding/control">
+  <Id Name="fb22c541-ded0-47fa-8877-83a4c2d16227" Revision="1" Stencil="7276b9ef-3953-4dce-a89b-ed85f20b8b93" StencilVersion="1.0"/>
+</Control>
+</file>
+
+<file path=customXml/item7.xml><?xml version="1.0" encoding="utf-8"?>
+<Control xmlns="http://schemas.microsoft.com/VisualStudio/2011/storyboarding/control">
+  <Id Name="a53d73d2-368b-429e-b817-1324eec1382c" Revision="1" Stencil="7276b9ef-3953-4dce-a89b-ed85f20b8b93" StencilVersion="1.0"/>
+</Control>
+</file>
+
+<file path=customXml/item8.xml><?xml version="1.0" encoding="utf-8"?>
 <?mso-contentType ?>
 <FormTemplates xmlns="http://schemas.microsoft.com/sharepoint/v3/contenttype/forms">
   <Display>DocumentLibraryForm</Display>
   <Edit>DocumentLibraryForm</Edit>
   <New>DocumentLibraryForm</New>
 </FormTemplates>
-</file>
-
-<file path=customXml/item6.xml><?xml version="1.0" encoding="utf-8"?>
-<Control xmlns="http://schemas.microsoft.com/VisualStudio/2011/storyboarding/control">
-  <Id Name="369f9055-6b6c-48b9-9320-5df2d46c430a" Revision="1" Stencil="7276b9ef-3953-4dce-a89b-ed85f20b8b93" StencilVersion="1.0"/>
-</Control>
-</file>
-
-<file path=customXml/item7.xml><?xml version="1.0" encoding="utf-8"?>
-<p:properties xmlns:p="http://schemas.microsoft.com/office/2006/metadata/properties" xmlns:xsi="http://www.w3.org/2001/XMLSchema-instance" xmlns:pc="http://schemas.microsoft.com/office/infopath/2007/PartnerControls">
-  <documentManagement>
-    <SharedWithUsers xmlns="83cd2334-221a-48c3-9034-bfd1542dfe28">
-      <UserInfo>
-        <DisplayName>Gilad Turbahn</DisplayName>
-        <AccountId>511</AccountId>
-        <AccountType/>
-      </UserInfo>
-      <UserInfo>
-        <DisplayName>Keith Boyd</DisplayName>
-        <AccountId>993</AccountId>
-        <AccountType/>
-      </UserInfo>
-      <UserInfo>
-        <DisplayName>Christopher Harrison</DisplayName>
-        <AccountId>1176</AccountId>
-        <AccountType/>
-      </UserInfo>
-    </SharedWithUsers>
-  </documentManagement>
-</p:properties>
-</file>
-
-<file path=customXml/item8.xml><?xml version="1.0" encoding="utf-8"?>
-<Control xmlns="http://schemas.microsoft.com/VisualStudio/2011/storyboarding/control">
-  <Id Name="a2191c86-fc50-4add-948c-129f6b5a88d8" Revision="1" Stencil="7276b9ef-3953-4dce-a89b-ed85f20b8b93" StencilVersion="1.0"/>
-</Control>
 </file>
 
 <file path=customXml/item9.xml><?xml version="1.0" encoding="utf-8"?>
@@ -45643,39 +43189,7 @@
 </file>
 
 <file path=customXml/itemProps1.xml><?xml version="1.0" encoding="utf-8"?>
-<ds:datastoreItem xmlns:ds="http://schemas.openxmlformats.org/officeDocument/2006/customXml" ds:itemID="{3DC6CABD-46E1-4C27-A0B3-616DC56F8E5C}">
-  <ds:schemaRefs>
-    <ds:schemaRef ds:uri="http://schemas.microsoft.com/VisualStudio/2011/storyboarding/control"/>
-  </ds:schemaRefs>
-</ds:datastoreItem>
-</file>
-
-<file path=customXml/itemProps10.xml><?xml version="1.0" encoding="utf-8"?>
-<ds:datastoreItem xmlns:ds="http://schemas.openxmlformats.org/officeDocument/2006/customXml" ds:itemID="{DD180159-5189-415B-9D51-B123F7569FCA}">
-  <ds:schemaRefs>
-    <ds:schemaRef ds:uri="http://schemas.microsoft.com/sharepoint/v3/contenttype/forms"/>
-  </ds:schemaRefs>
-</ds:datastoreItem>
-</file>
-
-<file path=customXml/itemProps11.xml><?xml version="1.0" encoding="utf-8"?>
-<ds:datastoreItem xmlns:ds="http://schemas.openxmlformats.org/officeDocument/2006/customXml" ds:itemID="{F68D8396-E21C-4AFF-8FDD-70D00673D0EE}">
-  <ds:schemaRefs>
-    <ds:schemaRef ds:uri="http://schemas.microsoft.com/VisualStudio/2011/storyboarding/control"/>
-  </ds:schemaRefs>
-</ds:datastoreItem>
-</file>
-
-<file path=customXml/itemProps12.xml><?xml version="1.0" encoding="utf-8"?>
-<ds:datastoreItem xmlns:ds="http://schemas.openxmlformats.org/officeDocument/2006/customXml" ds:itemID="{758FDAC0-319D-4A54-8D8E-1D42CB1F8004}">
-  <ds:schemaRefs>
-    <ds:schemaRef ds:uri="http://schemas.microsoft.com/sharepoint/v3/contenttype/forms"/>
-  </ds:schemaRefs>
-</ds:datastoreItem>
-</file>
-
-<file path=customXml/itemProps13.xml><?xml version="1.0" encoding="utf-8"?>
-<ds:datastoreItem xmlns:ds="http://schemas.openxmlformats.org/officeDocument/2006/customXml" ds:itemID="{F2DB1441-CF39-4D37-BBD5-243D4AD5F71A}">
+<ds:datastoreItem xmlns:ds="http://schemas.openxmlformats.org/officeDocument/2006/customXml" ds:itemID="{9BE78A66-4434-47C0-B320-1318DEA49846}">
   <ds:schemaRefs>
     <ds:schemaRef ds:uri="http://schemas.microsoft.com/office/2006/metadata/properties"/>
     <ds:schemaRef ds:uri="http://schemas.microsoft.com/office/infopath/2007/PartnerControls"/>
@@ -45684,8 +43198,44 @@
 </ds:datastoreItem>
 </file>
 
+<file path=customXml/itemProps10.xml><?xml version="1.0" encoding="utf-8"?>
+<ds:datastoreItem xmlns:ds="http://schemas.openxmlformats.org/officeDocument/2006/customXml" ds:itemID="{42D603BF-B513-4201-A599-21BA0F4FFC40}">
+  <ds:schemaRefs>
+    <ds:schemaRef ds:uri="http://schemas.microsoft.com/VisualStudio/2011/storyboarding/control"/>
+  </ds:schemaRefs>
+</ds:datastoreItem>
+</file>
+
+<file path=customXml/itemProps11.xml><?xml version="1.0" encoding="utf-8"?>
+<ds:datastoreItem xmlns:ds="http://schemas.openxmlformats.org/officeDocument/2006/customXml" ds:itemID="{2B0B218D-69BD-428E-BAF6-D3414B967109}">
+  <ds:schemaRefs>
+    <ds:schemaRef ds:uri="http://schemas.microsoft.com/office/2006/metadata/properties"/>
+    <ds:schemaRef ds:uri="http://schemas.microsoft.com/office/infopath/2007/PartnerControls"/>
+    <ds:schemaRef ds:uri="83cd2334-221a-48c3-9034-bfd1542dfe28"/>
+  </ds:schemaRefs>
+</ds:datastoreItem>
+</file>
+
+<file path=customXml/itemProps12.xml><?xml version="1.0" encoding="utf-8"?>
+<ds:datastoreItem xmlns:ds="http://schemas.openxmlformats.org/officeDocument/2006/customXml" ds:itemID="{6AFCD33B-75C8-402F-855A-E3F31351A5C9}">
+  <ds:schemaRefs>
+    <ds:schemaRef ds:uri="http://schemas.microsoft.com/office/2006/metadata/properties"/>
+    <ds:schemaRef ds:uri="http://schemas.microsoft.com/office/infopath/2007/PartnerControls"/>
+    <ds:schemaRef ds:uri="83cd2334-221a-48c3-9034-bfd1542dfe28"/>
+  </ds:schemaRefs>
+</ds:datastoreItem>
+</file>
+
+<file path=customXml/itemProps13.xml><?xml version="1.0" encoding="utf-8"?>
+<ds:datastoreItem xmlns:ds="http://schemas.openxmlformats.org/officeDocument/2006/customXml" ds:itemID="{3DC6CABD-46E1-4C27-A0B3-616DC56F8E5C}">
+  <ds:schemaRefs>
+    <ds:schemaRef ds:uri="http://schemas.microsoft.com/VisualStudio/2011/storyboarding/control"/>
+  </ds:schemaRefs>
+</ds:datastoreItem>
+</file>
+
 <file path=customXml/itemProps14.xml><?xml version="1.0" encoding="utf-8"?>
-<ds:datastoreItem xmlns:ds="http://schemas.openxmlformats.org/officeDocument/2006/customXml" ds:itemID="{C63AC2F0-1DEB-4E91-A88A-7A014A172F4F}">
+<ds:datastoreItem xmlns:ds="http://schemas.openxmlformats.org/officeDocument/2006/customXml" ds:itemID="{82DB428A-B8F8-483F-8276-095629A8ECDB}">
   <ds:schemaRefs>
     <ds:schemaRef ds:uri="http://schemas.microsoft.com/VisualStudio/2011/storyboarding/control"/>
   </ds:schemaRefs>
@@ -45693,6 +43243,14 @@
 </file>
 
 <file path=customXml/itemProps15.xml><?xml version="1.0" encoding="utf-8"?>
+<ds:datastoreItem xmlns:ds="http://schemas.openxmlformats.org/officeDocument/2006/customXml" ds:itemID="{1CB23883-94DE-437E-B761-50A8898E164E}">
+  <ds:schemaRefs>
+    <ds:schemaRef ds:uri="http://schemas.microsoft.com/sharepoint/v3/contenttype/forms"/>
+  </ds:schemaRefs>
+</ds:datastoreItem>
+</file>
+
+<file path=customXml/itemProps16.xml><?xml version="1.0" encoding="utf-8"?>
 <ds:datastoreItem xmlns:ds="http://schemas.openxmlformats.org/officeDocument/2006/customXml" ds:itemID="{FE651ABA-5DC1-4ABD-A06E-055AE54B337B}">
   <ds:schemaRefs>
     <ds:schemaRef ds:uri="http://schemas.microsoft.com/VisualStudio/2011/storyboarding/control"/>
@@ -45700,16 +43258,8 @@
 </ds:datastoreItem>
 </file>
 
-<file path=customXml/itemProps16.xml><?xml version="1.0" encoding="utf-8"?>
-<ds:datastoreItem xmlns:ds="http://schemas.openxmlformats.org/officeDocument/2006/customXml" ds:itemID="{B5105A87-47B6-44F6-97FD-4619C0556604}">
-  <ds:schemaRefs>
-    <ds:schemaRef ds:uri="http://schemas.microsoft.com/VisualStudio/2011/storyboarding/control"/>
-  </ds:schemaRefs>
-</ds:datastoreItem>
-</file>
-
 <file path=customXml/itemProps17.xml><?xml version="1.0" encoding="utf-8"?>
-<ds:datastoreItem xmlns:ds="http://schemas.openxmlformats.org/officeDocument/2006/customXml" ds:itemID="{8BD595CA-AC5E-43B9-B966-E468A16E8322}">
+<ds:datastoreItem xmlns:ds="http://schemas.openxmlformats.org/officeDocument/2006/customXml" ds:itemID="{4E8278DB-3CDD-48A7-992E-A7596AD335B9}">
   <ds:schemaRefs>
     <ds:schemaRef ds:uri="http://schemas.microsoft.com/VisualStudio/2011/storyboarding/control"/>
   </ds:schemaRefs>
@@ -45717,7 +43267,7 @@
 </file>
 
 <file path=customXml/itemProps18.xml><?xml version="1.0" encoding="utf-8"?>
-<ds:datastoreItem xmlns:ds="http://schemas.openxmlformats.org/officeDocument/2006/customXml" ds:itemID="{8893E80D-6D0C-4E0F-AA22-E5615BB87E5B}">
+<ds:datastoreItem xmlns:ds="http://schemas.openxmlformats.org/officeDocument/2006/customXml" ds:itemID="{0282FB20-2D4C-459D-8468-77D1D3C6925D}">
   <ds:schemaRefs>
     <ds:schemaRef ds:uri="http://schemas.microsoft.com/VisualStudio/2011/storyboarding/control"/>
   </ds:schemaRefs>
@@ -45725,7 +43275,7 @@
 </file>
 
 <file path=customXml/itemProps19.xml><?xml version="1.0" encoding="utf-8"?>
-<ds:datastoreItem xmlns:ds="http://schemas.openxmlformats.org/officeDocument/2006/customXml" ds:itemID="{9360AFB9-8F99-4E1B-878D-F2EBABEB164C}">
+<ds:datastoreItem xmlns:ds="http://schemas.openxmlformats.org/officeDocument/2006/customXml" ds:itemID="{1EF25EC2-965B-4491-9691-6B806C9E3B8B}">
   <ds:schemaRefs>
     <ds:schemaRef ds:uri="http://schemas.microsoft.com/sharepoint/v3/contenttype/forms"/>
   </ds:schemaRefs>
@@ -45741,22 +43291,48 @@
 </file>
 
 <file path=customXml/itemProps20.xml><?xml version="1.0" encoding="utf-8"?>
-<ds:datastoreItem xmlns:ds="http://schemas.openxmlformats.org/officeDocument/2006/customXml" ds:itemID="{D6FEE829-2115-45B4-8110-670FD454542B}">
+<ds:datastoreItem xmlns:ds="http://schemas.openxmlformats.org/officeDocument/2006/customXml" ds:itemID="{9360AFB9-8F99-4E1B-878D-F2EBABEB164C}">
+  <ds:schemaRefs>
+    <ds:schemaRef ds:uri="http://schemas.microsoft.com/sharepoint/v3/contenttype/forms"/>
+  </ds:schemaRefs>
+</ds:datastoreItem>
+</file>
+
+<file path=customXml/itemProps21.xml><?xml version="1.0" encoding="utf-8"?>
+<ds:datastoreItem xmlns:ds="http://schemas.openxmlformats.org/officeDocument/2006/customXml" ds:itemID="{DD180159-5189-415B-9D51-B123F7569FCA}">
+  <ds:schemaRefs>
+    <ds:schemaRef ds:uri="http://schemas.microsoft.com/sharepoint/v3/contenttype/forms"/>
+  </ds:schemaRefs>
+</ds:datastoreItem>
+</file>
+
+<file path=customXml/itemProps22.xml><?xml version="1.0" encoding="utf-8"?>
+<ds:datastoreItem xmlns:ds="http://schemas.openxmlformats.org/officeDocument/2006/customXml" ds:itemID="{6FB9D450-4C47-4A44-8C0D-C78D8A54C46F}">
   <ds:schemaRefs>
     <ds:schemaRef ds:uri="http://schemas.microsoft.com/VisualStudio/2011/storyboarding/control"/>
   </ds:schemaRefs>
 </ds:datastoreItem>
 </file>
 
-<file path=customXml/itemProps21.xml><?xml version="1.0" encoding="utf-8"?>
-<ds:datastoreItem xmlns:ds="http://schemas.openxmlformats.org/officeDocument/2006/customXml" ds:itemID="{21F6B647-976A-41D0-B760-9DF9DFC6AE3C}">
+<file path=customXml/itemProps23.xml><?xml version="1.0" encoding="utf-8"?>
+<ds:datastoreItem xmlns:ds="http://schemas.openxmlformats.org/officeDocument/2006/customXml" ds:itemID="{473A6A21-7521-4B81-9336-9B587BA12275}">
+  <ds:schemaRefs>
+    <ds:schemaRef ds:uri="http://schemas.microsoft.com/office/2006/metadata/properties"/>
+    <ds:schemaRef ds:uri="http://schemas.microsoft.com/office/infopath/2007/PartnerControls"/>
+    <ds:schemaRef ds:uri="83cd2334-221a-48c3-9034-bfd1542dfe28"/>
+  </ds:schemaRefs>
+</ds:datastoreItem>
+</file>
+
+<file path=customXml/itemProps24.xml><?xml version="1.0" encoding="utf-8"?>
+<ds:datastoreItem xmlns:ds="http://schemas.openxmlformats.org/officeDocument/2006/customXml" ds:itemID="{C63AC2F0-1DEB-4E91-A88A-7A014A172F4F}">
   <ds:schemaRefs>
     <ds:schemaRef ds:uri="http://schemas.microsoft.com/VisualStudio/2011/storyboarding/control"/>
   </ds:schemaRefs>
 </ds:datastoreItem>
 </file>
 
-<file path=customXml/itemProps22.xml><?xml version="1.0" encoding="utf-8"?>
+<file path=customXml/itemProps25.xml><?xml version="1.0" encoding="utf-8"?>
 <ds:datastoreItem xmlns:ds="http://schemas.openxmlformats.org/officeDocument/2006/customXml" ds:itemID="{432851C6-BC05-4673-B853-6D08AB80CDC4}">
   <ds:schemaRefs>
     <ds:schemaRef ds:uri="http://schemas.microsoft.com/VisualStudio/2011/storyboarding/control"/>
@@ -45764,32 +43340,8 @@
 </ds:datastoreItem>
 </file>
 
-<file path=customXml/itemProps23.xml><?xml version="1.0" encoding="utf-8"?>
-<ds:datastoreItem xmlns:ds="http://schemas.openxmlformats.org/officeDocument/2006/customXml" ds:itemID="{4E8278DB-3CDD-48A7-992E-A7596AD335B9}">
-  <ds:schemaRefs>
-    <ds:schemaRef ds:uri="http://schemas.microsoft.com/VisualStudio/2011/storyboarding/control"/>
-  </ds:schemaRefs>
-</ds:datastoreItem>
-</file>
-
-<file path=customXml/itemProps24.xml><?xml version="1.0" encoding="utf-8"?>
-<ds:datastoreItem xmlns:ds="http://schemas.openxmlformats.org/officeDocument/2006/customXml" ds:itemID="{7FA46DDE-FD42-428C-9A75-6D1D40C80BBB}">
-  <ds:schemaRefs>
-    <ds:schemaRef ds:uri="http://schemas.microsoft.com/sharepoint/v3/contenttype/forms"/>
-  </ds:schemaRefs>
-</ds:datastoreItem>
-</file>
-
-<file path=customXml/itemProps25.xml><?xml version="1.0" encoding="utf-8"?>
-<ds:datastoreItem xmlns:ds="http://schemas.openxmlformats.org/officeDocument/2006/customXml" ds:itemID="{D4B5F268-5930-44CD-BDF1-D0A04D4BBC1C}">
-  <ds:schemaRefs>
-    <ds:schemaRef ds:uri="http://schemas.microsoft.com/VisualStudio/2011/storyboarding/control"/>
-  </ds:schemaRefs>
-</ds:datastoreItem>
-</file>
-
 <file path=customXml/itemProps26.xml><?xml version="1.0" encoding="utf-8"?>
-<ds:datastoreItem xmlns:ds="http://schemas.openxmlformats.org/officeDocument/2006/customXml" ds:itemID="{08C4EE12-DF69-4FFC-9E40-C7991F3490A6}">
+<ds:datastoreItem xmlns:ds="http://schemas.openxmlformats.org/officeDocument/2006/customXml" ds:itemID="{3C954CC5-1CAC-4EC3-9791-8630483065B9}">
   <ds:schemaRefs>
     <ds:schemaRef ds:uri="http://schemas.microsoft.com/VisualStudio/2011/storyboarding/control"/>
   </ds:schemaRefs>
@@ -45797,7 +43349,7 @@
 </file>
 
 <file path=customXml/itemProps27.xml><?xml version="1.0" encoding="utf-8"?>
-<ds:datastoreItem xmlns:ds="http://schemas.openxmlformats.org/officeDocument/2006/customXml" ds:itemID="{3C954CC5-1CAC-4EC3-9791-8630483065B9}">
+<ds:datastoreItem xmlns:ds="http://schemas.openxmlformats.org/officeDocument/2006/customXml" ds:itemID="{ED350DFE-2319-4AB0-BC96-1D36D125365A}">
   <ds:schemaRefs>
     <ds:schemaRef ds:uri="http://schemas.microsoft.com/VisualStudio/2011/storyboarding/control"/>
   </ds:schemaRefs>
@@ -45805,7 +43357,7 @@
 </file>
 
 <file path=customXml/itemProps28.xml><?xml version="1.0" encoding="utf-8"?>
-<ds:datastoreItem xmlns:ds="http://schemas.openxmlformats.org/officeDocument/2006/customXml" ds:itemID="{0282FB20-2D4C-459D-8468-77D1D3C6925D}">
+<ds:datastoreItem xmlns:ds="http://schemas.openxmlformats.org/officeDocument/2006/customXml" ds:itemID="{67213E6F-7B96-4222-888B-63710B06D885}">
   <ds:schemaRefs>
     <ds:schemaRef ds:uri="http://schemas.microsoft.com/VisualStudio/2011/storyboarding/control"/>
   </ds:schemaRefs>
@@ -45813,14 +43365,48 @@
 </file>
 
 <file path=customXml/itemProps29.xml><?xml version="1.0" encoding="utf-8"?>
-<ds:datastoreItem xmlns:ds="http://schemas.openxmlformats.org/officeDocument/2006/customXml" ds:itemID="{85443668-3D6A-4188-8851-965D7DE77F1E}">
+<ds:datastoreItem xmlns:ds="http://schemas.openxmlformats.org/officeDocument/2006/customXml" ds:itemID="{C0F92A87-A216-45A9-B9C0-0515663D35BF}">
   <ds:schemaRefs>
-    <ds:schemaRef ds:uri="http://schemas.microsoft.com/sharepoint/v3/contenttype/forms"/>
+    <ds:schemaRef ds:uri="http://schemas.microsoft.com/VisualStudio/2011/storyboarding/control"/>
   </ds:schemaRefs>
 </ds:datastoreItem>
 </file>
 
 <file path=customXml/itemProps3.xml><?xml version="1.0" encoding="utf-8"?>
+<ds:datastoreItem xmlns:ds="http://schemas.openxmlformats.org/officeDocument/2006/customXml" ds:itemID="{B5105A87-47B6-44F6-97FD-4619C0556604}">
+  <ds:schemaRefs>
+    <ds:schemaRef ds:uri="http://schemas.microsoft.com/VisualStudio/2011/storyboarding/control"/>
+  </ds:schemaRefs>
+</ds:datastoreItem>
+</file>
+
+<file path=customXml/itemProps30.xml><?xml version="1.0" encoding="utf-8"?>
+<ds:datastoreItem xmlns:ds="http://schemas.openxmlformats.org/officeDocument/2006/customXml" ds:itemID="{366CA990-F93D-4100-9654-65D9E30F4E1C}">
+  <ds:schemaRefs>
+    <ds:schemaRef ds:uri="http://schemas.microsoft.com/VisualStudio/2011/storyboarding/control"/>
+  </ds:schemaRefs>
+</ds:datastoreItem>
+</file>
+
+<file path=customXml/itemProps31.xml><?xml version="1.0" encoding="utf-8"?>
+<ds:datastoreItem xmlns:ds="http://schemas.openxmlformats.org/officeDocument/2006/customXml" ds:itemID="{E692D73E-1478-4790-BEEC-C5C534998F40}">
+  <ds:schemaRefs>
+    <ds:schemaRef ds:uri="http://schemas.microsoft.com/office/2006/metadata/properties"/>
+    <ds:schemaRef ds:uri="http://schemas.microsoft.com/office/infopath/2007/PartnerControls"/>
+    <ds:schemaRef ds:uri="83cd2334-221a-48c3-9034-bfd1542dfe28"/>
+  </ds:schemaRefs>
+</ds:datastoreItem>
+</file>
+
+<file path=customXml/itemProps32.xml><?xml version="1.0" encoding="utf-8"?>
+<ds:datastoreItem xmlns:ds="http://schemas.openxmlformats.org/officeDocument/2006/customXml" ds:itemID="{0B54C583-7BAB-4080-8093-C5F84F5A225A}">
+  <ds:schemaRefs>
+    <ds:schemaRef ds:uri="http://schemas.microsoft.com/VisualStudio/2011/storyboarding/control"/>
+  </ds:schemaRefs>
+</ds:datastoreItem>
+</file>
+
+<file path=customXml/itemProps33.xml><?xml version="1.0" encoding="utf-8"?>
 <ds:datastoreItem xmlns:ds="http://schemas.openxmlformats.org/officeDocument/2006/customXml" ds:itemID="{11F98F69-7518-4AE2-AE7B-E037DC9DDC97}">
   <ds:schemaRefs>
     <ds:schemaRef ds:uri="http://schemas.microsoft.com/office/2006/metadata/contentType"/>
@@ -45838,50 +43424,16 @@
 </ds:datastoreItem>
 </file>
 
-<file path=customXml/itemProps30.xml><?xml version="1.0" encoding="utf-8"?>
-<ds:datastoreItem xmlns:ds="http://schemas.openxmlformats.org/officeDocument/2006/customXml" ds:itemID="{ED350DFE-2319-4AB0-BC96-1D36D125365A}">
+<file path=customXml/itemProps34.xml><?xml version="1.0" encoding="utf-8"?>
+<ds:datastoreItem xmlns:ds="http://schemas.openxmlformats.org/officeDocument/2006/customXml" ds:itemID="{758FDAC0-319D-4A54-8D8E-1D42CB1F8004}">
   <ds:schemaRefs>
-    <ds:schemaRef ds:uri="http://schemas.microsoft.com/VisualStudio/2011/storyboarding/control"/>
-  </ds:schemaRefs>
-</ds:datastoreItem>
-</file>
-
-<file path=customXml/itemProps31.xml><?xml version="1.0" encoding="utf-8"?>
-<ds:datastoreItem xmlns:ds="http://schemas.openxmlformats.org/officeDocument/2006/customXml" ds:itemID="{6FB9D450-4C47-4A44-8C0D-C78D8A54C46F}">
-  <ds:schemaRefs>
-    <ds:schemaRef ds:uri="http://schemas.microsoft.com/VisualStudio/2011/storyboarding/control"/>
-  </ds:schemaRefs>
-</ds:datastoreItem>
-</file>
-
-<file path=customXml/itemProps32.xml><?xml version="1.0" encoding="utf-8"?>
-<ds:datastoreItem xmlns:ds="http://schemas.openxmlformats.org/officeDocument/2006/customXml" ds:itemID="{F990F116-B58F-4255-B05B-DA3808E0E5C6}">
-  <ds:schemaRefs>
-    <ds:schemaRef ds:uri="http://schemas.microsoft.com/office/2006/metadata/properties"/>
-    <ds:schemaRef ds:uri="http://schemas.microsoft.com/office/infopath/2007/PartnerControls"/>
-    <ds:schemaRef ds:uri="83cd2334-221a-48c3-9034-bfd1542dfe28"/>
-  </ds:schemaRefs>
-</ds:datastoreItem>
-</file>
-
-<file path=customXml/itemProps33.xml><?xml version="1.0" encoding="utf-8"?>
-<ds:datastoreItem xmlns:ds="http://schemas.openxmlformats.org/officeDocument/2006/customXml" ds:itemID="{38217AA1-CC95-49A9-B284-2ED4D347D7CA}">
-  <ds:schemaRefs>
-    <ds:schemaRef ds:uri="http://schemas.microsoft.com/VisualStudio/2011/storyboarding/control"/>
-  </ds:schemaRefs>
-</ds:datastoreItem>
-</file>
-
-<file path=customXml/itemProps34.xml><?xml version="1.0" encoding="utf-8"?>
-<ds:datastoreItem xmlns:ds="http://schemas.openxmlformats.org/officeDocument/2006/customXml" ds:itemID="{8257D6BC-B71E-4D95-81E4-A1D4A8174168}">
-  <ds:schemaRefs>
-    <ds:schemaRef ds:uri="http://schemas.microsoft.com/VisualStudio/2011/storyboarding/control"/>
+    <ds:schemaRef ds:uri="http://schemas.microsoft.com/sharepoint/v3/contenttype/forms"/>
   </ds:schemaRefs>
 </ds:datastoreItem>
 </file>
 
 <file path=customXml/itemProps35.xml><?xml version="1.0" encoding="utf-8"?>
-<ds:datastoreItem xmlns:ds="http://schemas.openxmlformats.org/officeDocument/2006/customXml" ds:itemID="{67213E6F-7B96-4222-888B-63710B06D885}">
+<ds:datastoreItem xmlns:ds="http://schemas.openxmlformats.org/officeDocument/2006/customXml" ds:itemID="{8BD595CA-AC5E-43B9-B966-E468A16E8322}">
   <ds:schemaRefs>
     <ds:schemaRef ds:uri="http://schemas.microsoft.com/VisualStudio/2011/storyboarding/control"/>
   </ds:schemaRefs>
@@ -45889,15 +43441,15 @@
 </file>
 
 <file path=customXml/itemProps36.xml><?xml version="1.0" encoding="utf-8"?>
-<ds:datastoreItem xmlns:ds="http://schemas.openxmlformats.org/officeDocument/2006/customXml" ds:itemID="{1EF25EC2-965B-4491-9691-6B806C9E3B8B}">
+<ds:datastoreItem xmlns:ds="http://schemas.openxmlformats.org/officeDocument/2006/customXml" ds:itemID="{D4B5F268-5930-44CD-BDF1-D0A04D4BBC1C}">
   <ds:schemaRefs>
-    <ds:schemaRef ds:uri="http://schemas.microsoft.com/sharepoint/v3/contenttype/forms"/>
+    <ds:schemaRef ds:uri="http://schemas.microsoft.com/VisualStudio/2011/storyboarding/control"/>
   </ds:schemaRefs>
 </ds:datastoreItem>
 </file>
 
 <file path=customXml/itemProps37.xml><?xml version="1.0" encoding="utf-8"?>
-<ds:datastoreItem xmlns:ds="http://schemas.openxmlformats.org/officeDocument/2006/customXml" ds:itemID="{42D603BF-B513-4201-A599-21BA0F4FFC40}">
+<ds:datastoreItem xmlns:ds="http://schemas.openxmlformats.org/officeDocument/2006/customXml" ds:itemID="{38217AA1-CC95-49A9-B284-2ED4D347D7CA}">
   <ds:schemaRefs>
     <ds:schemaRef ds:uri="http://schemas.microsoft.com/VisualStudio/2011/storyboarding/control"/>
   </ds:schemaRefs>
@@ -45913,7 +43465,7 @@
 </file>
 
 <file path=customXml/itemProps39.xml><?xml version="1.0" encoding="utf-8"?>
-<ds:datastoreItem xmlns:ds="http://schemas.openxmlformats.org/officeDocument/2006/customXml" ds:itemID="{4B16F4FE-7C26-4443-B426-81998D23ED87}">
+<ds:datastoreItem xmlns:ds="http://schemas.openxmlformats.org/officeDocument/2006/customXml" ds:itemID="{08C4EE12-DF69-4FFC-9E40-C7991F3490A6}">
   <ds:schemaRefs>
     <ds:schemaRef ds:uri="http://schemas.microsoft.com/VisualStudio/2011/storyboarding/control"/>
   </ds:schemaRefs>
@@ -45921,15 +43473,15 @@
 </file>
 
 <file path=customXml/itemProps4.xml><?xml version="1.0" encoding="utf-8"?>
-<ds:datastoreItem xmlns:ds="http://schemas.openxmlformats.org/officeDocument/2006/customXml" ds:itemID="{366CA990-F93D-4100-9654-65D9E30F4E1C}">
+<ds:datastoreItem xmlns:ds="http://schemas.openxmlformats.org/officeDocument/2006/customXml" ds:itemID="{85443668-3D6A-4188-8851-965D7DE77F1E}">
   <ds:schemaRefs>
-    <ds:schemaRef ds:uri="http://schemas.microsoft.com/VisualStudio/2011/storyboarding/control"/>
+    <ds:schemaRef ds:uri="http://schemas.microsoft.com/sharepoint/v3/contenttype/forms"/>
   </ds:schemaRefs>
 </ds:datastoreItem>
 </file>
 
 <file path=customXml/itemProps40.xml><?xml version="1.0" encoding="utf-8"?>
-<ds:datastoreItem xmlns:ds="http://schemas.openxmlformats.org/officeDocument/2006/customXml" ds:itemID="{2B0B218D-69BD-428E-BAF6-D3414B967109}">
+<ds:datastoreItem xmlns:ds="http://schemas.openxmlformats.org/officeDocument/2006/customXml" ds:itemID="{F2DB1441-CF39-4D37-BBD5-243D4AD5F71A}">
   <ds:schemaRefs>
     <ds:schemaRef ds:uri="http://schemas.microsoft.com/office/2006/metadata/properties"/>
     <ds:schemaRef ds:uri="http://schemas.microsoft.com/office/infopath/2007/PartnerControls"/>
@@ -45939,6 +43491,54 @@
 </file>
 
 <file path=customXml/itemProps41.xml><?xml version="1.0" encoding="utf-8"?>
+<ds:datastoreItem xmlns:ds="http://schemas.openxmlformats.org/officeDocument/2006/customXml" ds:itemID="{8893E80D-6D0C-4E0F-AA22-E5615BB87E5B}">
+  <ds:schemaRefs>
+    <ds:schemaRef ds:uri="http://schemas.microsoft.com/VisualStudio/2011/storyboarding/control"/>
+  </ds:schemaRefs>
+</ds:datastoreItem>
+</file>
+
+<file path=customXml/itemProps42.xml><?xml version="1.0" encoding="utf-8"?>
+<ds:datastoreItem xmlns:ds="http://schemas.openxmlformats.org/officeDocument/2006/customXml" ds:itemID="{4B16F4FE-7C26-4443-B426-81998D23ED87}">
+  <ds:schemaRefs>
+    <ds:schemaRef ds:uri="http://schemas.microsoft.com/VisualStudio/2011/storyboarding/control"/>
+  </ds:schemaRefs>
+</ds:datastoreItem>
+</file>
+
+<file path=customXml/itemProps43.xml><?xml version="1.0" encoding="utf-8"?>
+<ds:datastoreItem xmlns:ds="http://schemas.openxmlformats.org/officeDocument/2006/customXml" ds:itemID="{21F6B647-976A-41D0-B760-9DF9DFC6AE3C}">
+  <ds:schemaRefs>
+    <ds:schemaRef ds:uri="http://schemas.microsoft.com/VisualStudio/2011/storyboarding/control"/>
+  </ds:schemaRefs>
+</ds:datastoreItem>
+</file>
+
+<file path=customXml/itemProps44.xml><?xml version="1.0" encoding="utf-8"?>
+<ds:datastoreItem xmlns:ds="http://schemas.openxmlformats.org/officeDocument/2006/customXml" ds:itemID="{8257D6BC-B71E-4D95-81E4-A1D4A8174168}">
+  <ds:schemaRefs>
+    <ds:schemaRef ds:uri="http://schemas.microsoft.com/VisualStudio/2011/storyboarding/control"/>
+  </ds:schemaRefs>
+</ds:datastoreItem>
+</file>
+
+<file path=customXml/itemProps45.xml><?xml version="1.0" encoding="utf-8"?>
+<ds:datastoreItem xmlns:ds="http://schemas.openxmlformats.org/officeDocument/2006/customXml" ds:itemID="{4E805D65-1532-4BB0-8F41-8013167C0009}">
+  <ds:schemaRefs>
+    <ds:schemaRef ds:uri="http://schemas.microsoft.com/VisualStudio/2011/storyboarding/control"/>
+  </ds:schemaRefs>
+</ds:datastoreItem>
+</file>
+
+<file path=customXml/itemProps5.xml><?xml version="1.0" encoding="utf-8"?>
+<ds:datastoreItem xmlns:ds="http://schemas.openxmlformats.org/officeDocument/2006/customXml" ds:itemID="{D6FEE829-2115-45B4-8110-670FD454542B}">
+  <ds:schemaRefs>
+    <ds:schemaRef ds:uri="http://schemas.microsoft.com/VisualStudio/2011/storyboarding/control"/>
+  </ds:schemaRefs>
+</ds:datastoreItem>
+</file>
+
+<file path=customXml/itemProps6.xml><?xml version="1.0" encoding="utf-8"?>
 <ds:datastoreItem xmlns:ds="http://schemas.openxmlformats.org/officeDocument/2006/customXml" ds:itemID="{4C1B3C27-4803-4D72-A3F8-6668A3F0A24B}">
   <ds:schemaRefs>
     <ds:schemaRef ds:uri="http://schemas.microsoft.com/VisualStudio/2011/storyboarding/control"/>
@@ -45946,78 +43546,24 @@
 </ds:datastoreItem>
 </file>
 
-<file path=customXml/itemProps42.xml><?xml version="1.0" encoding="utf-8"?>
-<ds:datastoreItem xmlns:ds="http://schemas.openxmlformats.org/officeDocument/2006/customXml" ds:itemID="{4E805D65-1532-4BB0-8F41-8013167C0009}">
+<file path=customXml/itemProps7.xml><?xml version="1.0" encoding="utf-8"?>
+<ds:datastoreItem xmlns:ds="http://schemas.openxmlformats.org/officeDocument/2006/customXml" ds:itemID="{F68D8396-E21C-4AFF-8FDD-70D00673D0EE}">
   <ds:schemaRefs>
     <ds:schemaRef ds:uri="http://schemas.microsoft.com/VisualStudio/2011/storyboarding/control"/>
   </ds:schemaRefs>
 </ds:datastoreItem>
 </file>
 
-<file path=customXml/itemProps43.xml><?xml version="1.0" encoding="utf-8"?>
-<ds:datastoreItem xmlns:ds="http://schemas.openxmlformats.org/officeDocument/2006/customXml" ds:itemID="{C0F92A87-A216-45A9-B9C0-0515663D35BF}">
-  <ds:schemaRefs>
-    <ds:schemaRef ds:uri="http://schemas.microsoft.com/VisualStudio/2011/storyboarding/control"/>
-  </ds:schemaRefs>
-</ds:datastoreItem>
-</file>
-
-<file path=customXml/itemProps44.xml><?xml version="1.0" encoding="utf-8"?>
-<ds:datastoreItem xmlns:ds="http://schemas.openxmlformats.org/officeDocument/2006/customXml" ds:itemID="{473A6A21-7521-4B81-9336-9B587BA12275}">
-  <ds:schemaRefs>
-    <ds:schemaRef ds:uri="http://schemas.microsoft.com/office/2006/metadata/properties"/>
-    <ds:schemaRef ds:uri="http://schemas.microsoft.com/office/infopath/2007/PartnerControls"/>
-    <ds:schemaRef ds:uri="83cd2334-221a-48c3-9034-bfd1542dfe28"/>
-  </ds:schemaRefs>
-</ds:datastoreItem>
-</file>
-
-<file path=customXml/itemProps45.xml><?xml version="1.0" encoding="utf-8"?>
-<ds:datastoreItem xmlns:ds="http://schemas.openxmlformats.org/officeDocument/2006/customXml" ds:itemID="{6AFCD33B-75C8-402F-855A-E3F31351A5C9}">
-  <ds:schemaRefs>
-    <ds:schemaRef ds:uri="http://schemas.microsoft.com/office/2006/metadata/properties"/>
-    <ds:schemaRef ds:uri="http://schemas.microsoft.com/office/infopath/2007/PartnerControls"/>
-    <ds:schemaRef ds:uri="83cd2334-221a-48c3-9034-bfd1542dfe28"/>
-  </ds:schemaRefs>
-</ds:datastoreItem>
-</file>
-
-<file path=customXml/itemProps5.xml><?xml version="1.0" encoding="utf-8"?>
-<ds:datastoreItem xmlns:ds="http://schemas.openxmlformats.org/officeDocument/2006/customXml" ds:itemID="{1CB23883-94DE-437E-B761-50A8898E164E}">
+<file path=customXml/itemProps8.xml><?xml version="1.0" encoding="utf-8"?>
+<ds:datastoreItem xmlns:ds="http://schemas.openxmlformats.org/officeDocument/2006/customXml" ds:itemID="{7FA46DDE-FD42-428C-9A75-6D1D40C80BBB}">
   <ds:schemaRefs>
     <ds:schemaRef ds:uri="http://schemas.microsoft.com/sharepoint/v3/contenttype/forms"/>
   </ds:schemaRefs>
 </ds:datastoreItem>
 </file>
 
-<file path=customXml/itemProps6.xml><?xml version="1.0" encoding="utf-8"?>
-<ds:datastoreItem xmlns:ds="http://schemas.openxmlformats.org/officeDocument/2006/customXml" ds:itemID="{82DB428A-B8F8-483F-8276-095629A8ECDB}">
-  <ds:schemaRefs>
-    <ds:schemaRef ds:uri="http://schemas.microsoft.com/VisualStudio/2011/storyboarding/control"/>
-  </ds:schemaRefs>
-</ds:datastoreItem>
-</file>
-
-<file path=customXml/itemProps7.xml><?xml version="1.0" encoding="utf-8"?>
-<ds:datastoreItem xmlns:ds="http://schemas.openxmlformats.org/officeDocument/2006/customXml" ds:itemID="{9BE78A66-4434-47C0-B320-1318DEA49846}">
-  <ds:schemaRefs>
-    <ds:schemaRef ds:uri="http://schemas.microsoft.com/office/2006/metadata/properties"/>
-    <ds:schemaRef ds:uri="http://schemas.microsoft.com/office/infopath/2007/PartnerControls"/>
-    <ds:schemaRef ds:uri="83cd2334-221a-48c3-9034-bfd1542dfe28"/>
-  </ds:schemaRefs>
-</ds:datastoreItem>
-</file>
-
-<file path=customXml/itemProps8.xml><?xml version="1.0" encoding="utf-8"?>
-<ds:datastoreItem xmlns:ds="http://schemas.openxmlformats.org/officeDocument/2006/customXml" ds:itemID="{0B54C583-7BAB-4080-8093-C5F84F5A225A}">
-  <ds:schemaRefs>
-    <ds:schemaRef ds:uri="http://schemas.microsoft.com/VisualStudio/2011/storyboarding/control"/>
-  </ds:schemaRefs>
-</ds:datastoreItem>
-</file>
-
 <file path=customXml/itemProps9.xml><?xml version="1.0" encoding="utf-8"?>
-<ds:datastoreItem xmlns:ds="http://schemas.openxmlformats.org/officeDocument/2006/customXml" ds:itemID="{E692D73E-1478-4790-BEEC-C5C534998F40}">
+<ds:datastoreItem xmlns:ds="http://schemas.openxmlformats.org/officeDocument/2006/customXml" ds:itemID="{F990F116-B58F-4255-B05B-DA3808E0E5C6}">
   <ds:schemaRefs>
     <ds:schemaRef ds:uri="http://schemas.microsoft.com/office/2006/metadata/properties"/>
     <ds:schemaRef ds:uri="http://schemas.microsoft.com/office/infopath/2007/PartnerControls"/>

</xml_diff>